<commit_message>
Updated document that refer AWS Lambda link.
</commit_message>
<xml_diff>
--- a/blob/BriteCore PoC WebAPI Presentation.pptx
+++ b/blob/BriteCore PoC WebAPI Presentation.pptx
@@ -6,23 +6,26 @@
   </p:sldMasterIdLst>
   <p:sldIdLst>
     <p:sldId id="266" r:id="rId2"/>
-    <p:sldId id="273" r:id="rId3"/>
-    <p:sldId id="267" r:id="rId4"/>
-    <p:sldId id="268" r:id="rId5"/>
-    <p:sldId id="269" r:id="rId6"/>
-    <p:sldId id="270" r:id="rId7"/>
-    <p:sldId id="271" r:id="rId8"/>
-    <p:sldId id="256" r:id="rId9"/>
-    <p:sldId id="257" r:id="rId10"/>
-    <p:sldId id="261" r:id="rId11"/>
-    <p:sldId id="258" r:id="rId12"/>
-    <p:sldId id="259" r:id="rId13"/>
-    <p:sldId id="262" r:id="rId14"/>
-    <p:sldId id="263" r:id="rId15"/>
-    <p:sldId id="264" r:id="rId16"/>
-    <p:sldId id="265" r:id="rId17"/>
-    <p:sldId id="260" r:id="rId18"/>
-    <p:sldId id="272" r:id="rId19"/>
+    <p:sldId id="274" r:id="rId3"/>
+    <p:sldId id="273" r:id="rId4"/>
+    <p:sldId id="275" r:id="rId5"/>
+    <p:sldId id="276" r:id="rId6"/>
+    <p:sldId id="267" r:id="rId7"/>
+    <p:sldId id="268" r:id="rId8"/>
+    <p:sldId id="269" r:id="rId9"/>
+    <p:sldId id="270" r:id="rId10"/>
+    <p:sldId id="271" r:id="rId11"/>
+    <p:sldId id="256" r:id="rId12"/>
+    <p:sldId id="257" r:id="rId13"/>
+    <p:sldId id="261" r:id="rId14"/>
+    <p:sldId id="258" r:id="rId15"/>
+    <p:sldId id="259" r:id="rId16"/>
+    <p:sldId id="262" r:id="rId17"/>
+    <p:sldId id="263" r:id="rId18"/>
+    <p:sldId id="264" r:id="rId19"/>
+    <p:sldId id="265" r:id="rId20"/>
+    <p:sldId id="260" r:id="rId21"/>
+    <p:sldId id="272" r:id="rId22"/>
   </p:sldIdLst>
   <p:sldSz cx="9144000" cy="6858000" type="screen4x3"/>
   <p:notesSz cx="6858000" cy="9144000"/>
@@ -306,7 +309,7 @@
             <a:fld id="{D435F4EF-751A-4746-AFF7-1E1195B3F960}" type="datetimeFigureOut">
               <a:rPr lang="en-US" smtClean="0"/>
               <a:pPr/>
-              <a:t>7/7/2018</a:t>
+              <a:t>12/20/2018</a:t>
             </a:fld>
             <a:endParaRPr lang="en-US"/>
           </a:p>
@@ -473,7 +476,7 @@
             <a:fld id="{D435F4EF-751A-4746-AFF7-1E1195B3F960}" type="datetimeFigureOut">
               <a:rPr lang="en-US" smtClean="0"/>
               <a:pPr/>
-              <a:t>7/7/2018</a:t>
+              <a:t>12/20/2018</a:t>
             </a:fld>
             <a:endParaRPr lang="en-US"/>
           </a:p>
@@ -650,7 +653,7 @@
             <a:fld id="{D435F4EF-751A-4746-AFF7-1E1195B3F960}" type="datetimeFigureOut">
               <a:rPr lang="en-US" smtClean="0"/>
               <a:pPr/>
-              <a:t>7/7/2018</a:t>
+              <a:t>12/20/2018</a:t>
             </a:fld>
             <a:endParaRPr lang="en-US"/>
           </a:p>
@@ -817,7 +820,7 @@
             <a:fld id="{D435F4EF-751A-4746-AFF7-1E1195B3F960}" type="datetimeFigureOut">
               <a:rPr lang="en-US" smtClean="0"/>
               <a:pPr/>
-              <a:t>7/7/2018</a:t>
+              <a:t>12/20/2018</a:t>
             </a:fld>
             <a:endParaRPr lang="en-US"/>
           </a:p>
@@ -1060,7 +1063,7 @@
             <a:fld id="{D435F4EF-751A-4746-AFF7-1E1195B3F960}" type="datetimeFigureOut">
               <a:rPr lang="en-US" smtClean="0"/>
               <a:pPr/>
-              <a:t>7/7/2018</a:t>
+              <a:t>12/20/2018</a:t>
             </a:fld>
             <a:endParaRPr lang="en-US"/>
           </a:p>
@@ -1345,7 +1348,7 @@
             <a:fld id="{D435F4EF-751A-4746-AFF7-1E1195B3F960}" type="datetimeFigureOut">
               <a:rPr lang="en-US" smtClean="0"/>
               <a:pPr/>
-              <a:t>7/7/2018</a:t>
+              <a:t>12/20/2018</a:t>
             </a:fld>
             <a:endParaRPr lang="en-US"/>
           </a:p>
@@ -1764,7 +1767,7 @@
             <a:fld id="{D435F4EF-751A-4746-AFF7-1E1195B3F960}" type="datetimeFigureOut">
               <a:rPr lang="en-US" smtClean="0"/>
               <a:pPr/>
-              <a:t>7/7/2018</a:t>
+              <a:t>12/20/2018</a:t>
             </a:fld>
             <a:endParaRPr lang="en-US"/>
           </a:p>
@@ -1879,7 +1882,7 @@
             <a:fld id="{D435F4EF-751A-4746-AFF7-1E1195B3F960}" type="datetimeFigureOut">
               <a:rPr lang="en-US" smtClean="0"/>
               <a:pPr/>
-              <a:t>7/7/2018</a:t>
+              <a:t>12/20/2018</a:t>
             </a:fld>
             <a:endParaRPr lang="en-US"/>
           </a:p>
@@ -1971,7 +1974,7 @@
             <a:fld id="{D435F4EF-751A-4746-AFF7-1E1195B3F960}" type="datetimeFigureOut">
               <a:rPr lang="en-US" smtClean="0"/>
               <a:pPr/>
-              <a:t>7/7/2018</a:t>
+              <a:t>12/20/2018</a:t>
             </a:fld>
             <a:endParaRPr lang="en-US"/>
           </a:p>
@@ -2245,7 +2248,7 @@
             <a:fld id="{D435F4EF-751A-4746-AFF7-1E1195B3F960}" type="datetimeFigureOut">
               <a:rPr lang="en-US" smtClean="0"/>
               <a:pPr/>
-              <a:t>7/7/2018</a:t>
+              <a:t>12/20/2018</a:t>
             </a:fld>
             <a:endParaRPr lang="en-US"/>
           </a:p>
@@ -2495,7 +2498,7 @@
             <a:fld id="{D435F4EF-751A-4746-AFF7-1E1195B3F960}" type="datetimeFigureOut">
               <a:rPr lang="en-US" smtClean="0"/>
               <a:pPr/>
-              <a:t>7/7/2018</a:t>
+              <a:t>12/20/2018</a:t>
             </a:fld>
             <a:endParaRPr lang="en-US"/>
           </a:p>
@@ -2705,7 +2708,7 @@
             <a:fld id="{D435F4EF-751A-4746-AFF7-1E1195B3F960}" type="datetimeFigureOut">
               <a:rPr lang="en-US" smtClean="0"/>
               <a:pPr/>
-              <a:t>7/7/2018</a:t>
+              <a:t>12/20/2018</a:t>
             </a:fld>
             <a:endParaRPr lang="en-US"/>
           </a:p>
@@ -3105,11 +3108,7 @@
             </a:r>
             <a:r>
               <a:rPr lang="en-US" dirty="0" smtClean="0"/>
-              <a:t> </a:t>
-            </a:r>
-            <a:r>
-              <a:rPr lang="en-US" dirty="0" smtClean="0"/>
-              <a:t>Web API</a:t>
+              <a:t> Web API</a:t>
             </a:r>
             <a:endParaRPr lang="en-US" dirty="0"/>
           </a:p>
@@ -3141,38 +3140,15 @@
               <a:rPr lang="en-US" dirty="0" smtClean="0">
                 <a:hlinkClick r:id="rId2"/>
               </a:rPr>
-              <a:t>https://britecore-poc-server-session.herokuapp.com/auth/login</a:t>
-            </a:r>
-            <a:r>
-              <a:rPr lang="en-US" dirty="0" smtClean="0">
-                <a:hlinkClick r:id="rId2"/>
-              </a:rPr>
-              <a:t>/</a:t>
+              <a:t>https://britecore-poc-server-session.herokuapp.com/auth/login/</a:t>
             </a:r>
             <a:endParaRPr lang="en-US" dirty="0" smtClean="0"/>
           </a:p>
           <a:p>
             <a:r>
               <a:rPr lang="en-US" dirty="0" smtClean="0"/>
-              <a:t>Use </a:t>
-            </a:r>
-            <a:r>
-              <a:rPr lang="en-US" dirty="0" smtClean="0"/>
-              <a:t>above link to access </a:t>
-            </a:r>
-            <a:r>
-              <a:rPr lang="en-US" dirty="0" smtClean="0"/>
-              <a:t>browsable </a:t>
-            </a:r>
-            <a:r>
-              <a:rPr lang="en-US" dirty="0" smtClean="0"/>
-              <a:t>Web API</a:t>
-            </a:r>
-            <a:r>
-              <a:rPr lang="en-US" dirty="0" smtClean="0"/>
-              <a:t>.</a:t>
-            </a:r>
-            <a:endParaRPr lang="en-US" dirty="0" smtClean="0"/>
+              <a:t>Use above link to access browsable Web API.</a:t>
+            </a:r>
           </a:p>
           <a:p>
             <a:r>
@@ -3185,55 +3161,25 @@
             </a:r>
             <a:r>
               <a:rPr lang="en-US" dirty="0" smtClean="0"/>
-              <a:t> (lower case</a:t>
-            </a:r>
-            <a:r>
-              <a:rPr lang="en-US" dirty="0" smtClean="0"/>
-              <a:t>) – Admin</a:t>
-            </a:r>
-            <a:endParaRPr lang="en-US" dirty="0" smtClean="0"/>
-          </a:p>
-          <a:p>
-            <a:r>
-              <a:rPr lang="en-US" dirty="0" smtClean="0"/>
-              <a:t>Password :- poctest#1  (lower case</a:t>
-            </a:r>
-            <a:r>
-              <a:rPr lang="en-US" dirty="0" smtClean="0"/>
-              <a:t>)</a:t>
-            </a:r>
-          </a:p>
-          <a:p>
-            <a:r>
-              <a:rPr lang="en-US" dirty="0" smtClean="0"/>
-              <a:t>Username :- </a:t>
-            </a:r>
-            <a:r>
-              <a:rPr lang="en-US" dirty="0" smtClean="0"/>
-              <a:t>editor </a:t>
-            </a:r>
-            <a:r>
-              <a:rPr lang="en-US" dirty="0" smtClean="0"/>
-              <a:t>(lower case) – </a:t>
-            </a:r>
-            <a:r>
-              <a:rPr lang="en-US" dirty="0" smtClean="0"/>
-              <a:t>Non Admin</a:t>
-            </a:r>
-            <a:endParaRPr lang="en-US" dirty="0" smtClean="0"/>
-          </a:p>
-          <a:p>
-            <a:r>
-              <a:rPr lang="en-US" dirty="0" smtClean="0"/>
-              <a:t>Password :- </a:t>
-            </a:r>
-            <a:r>
-              <a:rPr lang="en-US" dirty="0" smtClean="0"/>
-              <a:t>test#123  </a:t>
-            </a:r>
-            <a:r>
-              <a:rPr lang="en-US" dirty="0" smtClean="0"/>
-              <a:t>(lower case)</a:t>
+              <a:t> (lower case) – Admin</a:t>
+            </a:r>
+          </a:p>
+          <a:p>
+            <a:r>
+              <a:rPr lang="en-US" dirty="0" smtClean="0"/>
+              <a:t>Password :- poctest#1  (lower case)</a:t>
+            </a:r>
+          </a:p>
+          <a:p>
+            <a:r>
+              <a:rPr lang="en-US" dirty="0" smtClean="0"/>
+              <a:t>Username :- editor (lower case) – Non Admin</a:t>
+            </a:r>
+          </a:p>
+          <a:p>
+            <a:r>
+              <a:rPr lang="en-US" dirty="0" smtClean="0"/>
+              <a:t>Password :- test#123  (lower case)</a:t>
             </a:r>
           </a:p>
           <a:p>
@@ -3290,45 +3236,77 @@
           <a:p>
             <a:r>
               <a:rPr lang="en-US" dirty="0" smtClean="0"/>
-              <a:t>Enter credentials</a:t>
+              <a:t>Salient features (continued)</a:t>
             </a:r>
             <a:endParaRPr lang="en-US" dirty="0"/>
           </a:p>
         </p:txBody>
       </p:sp>
-      <p:pic>
-        <p:nvPicPr>
-          <p:cNvPr id="2052" name="Picture 4"/>
-          <p:cNvPicPr>
-            <a:picLocks noChangeAspect="1" noChangeArrowheads="1"/>
-          </p:cNvPicPr>
-          <p:nvPr/>
-        </p:nvPicPr>
-        <p:blipFill>
-          <a:blip r:embed="rId2"/>
-          <a:srcRect/>
-          <a:stretch>
-            <a:fillRect/>
-          </a:stretch>
-        </p:blipFill>
-        <p:spPr bwMode="auto">
-          <a:xfrm>
-            <a:off x="234950" y="1295400"/>
-            <a:ext cx="8674100" cy="4572000"/>
-          </a:xfrm>
-          <a:prstGeom prst="rect">
-            <a:avLst/>
-          </a:prstGeom>
-          <a:noFill/>
-          <a:ln w="9525">
-            <a:noFill/>
-            <a:miter lim="800000"/>
-            <a:headEnd/>
-            <a:tailEnd/>
-          </a:ln>
-          <a:effectLst/>
-        </p:spPr>
-      </p:pic>
+      <p:sp>
+        <p:nvSpPr>
+          <p:cNvPr id="3" name="Content Placeholder 2"/>
+          <p:cNvSpPr>
+            <a:spLocks noGrp="1"/>
+          </p:cNvSpPr>
+          <p:nvPr>
+            <p:ph idx="1"/>
+          </p:nvPr>
+        </p:nvSpPr>
+        <p:spPr/>
+        <p:txBody>
+          <a:bodyPr/>
+          <a:lstStyle/>
+          <a:p>
+            <a:pPr>
+              <a:lnSpc>
+                <a:spcPct val="80000"/>
+              </a:lnSpc>
+            </a:pPr>
+            <a:r>
+              <a:rPr lang="en-US" sz="2200" dirty="0" smtClean="0"/>
+              <a:t>Used Default router to list all available links and </a:t>
+            </a:r>
+            <a:r>
+              <a:rPr lang="en-US" sz="2200" dirty="0" err="1" smtClean="0"/>
+              <a:t>Pastebin</a:t>
+            </a:r>
+            <a:r>
+              <a:rPr lang="en-US" sz="2200" dirty="0" smtClean="0"/>
+              <a:t> docs and schema information also available for API.</a:t>
+            </a:r>
+          </a:p>
+          <a:p>
+            <a:pPr>
+              <a:lnSpc>
+                <a:spcPct val="80000"/>
+              </a:lnSpc>
+            </a:pPr>
+            <a:endParaRPr lang="en-US" sz="2200" dirty="0" smtClean="0"/>
+          </a:p>
+          <a:p>
+            <a:pPr>
+              <a:lnSpc>
+                <a:spcPct val="80000"/>
+              </a:lnSpc>
+            </a:pPr>
+            <a:r>
+              <a:rPr lang="en-US" sz="2200" dirty="0" smtClean="0"/>
+              <a:t>One touch </a:t>
+            </a:r>
+            <a:r>
+              <a:rPr lang="en-US" sz="2200" dirty="0" err="1" smtClean="0"/>
+              <a:t>Heroku</a:t>
+            </a:r>
+            <a:r>
+              <a:rPr lang="en-US" sz="2200" dirty="0" smtClean="0"/>
+              <a:t> deploy button.</a:t>
+            </a:r>
+          </a:p>
+          <a:p>
+            <a:endParaRPr lang="en-US" dirty="0"/>
+          </a:p>
+        </p:txBody>
+      </p:sp>
     </p:spTree>
   </p:cSld>
   <p:clrMapOvr>
@@ -3345,1545 +3323,6 @@
 </file>
 
 <file path=ppt/slides/slide11.xml><?xml version="1.0" encoding="utf-8"?>
-<p:sld xmlns:a="http://schemas.openxmlformats.org/drawingml/2006/main" xmlns:r="http://schemas.openxmlformats.org/officeDocument/2006/relationships" xmlns:p="http://schemas.openxmlformats.org/presentationml/2006/main">
-  <p:cSld>
-    <p:spTree>
-      <p:nvGrpSpPr>
-        <p:cNvPr id="1" name=""/>
-        <p:cNvGrpSpPr/>
-        <p:nvPr/>
-      </p:nvGrpSpPr>
-      <p:grpSpPr>
-        <a:xfrm>
-          <a:off x="0" y="0"/>
-          <a:ext cx="0" cy="0"/>
-          <a:chOff x="0" y="0"/>
-          <a:chExt cx="0" cy="0"/>
-        </a:xfrm>
-      </p:grpSpPr>
-      <p:sp>
-        <p:nvSpPr>
-          <p:cNvPr id="2" name="Title 1"/>
-          <p:cNvSpPr>
-            <a:spLocks noGrp="1"/>
-          </p:cNvSpPr>
-          <p:nvPr>
-            <p:ph type="title"/>
-          </p:nvPr>
-        </p:nvSpPr>
-        <p:spPr/>
-        <p:txBody>
-          <a:bodyPr/>
-          <a:lstStyle/>
-          <a:p>
-            <a:r>
-              <a:rPr lang="en-US" dirty="0" smtClean="0"/>
-              <a:t>Successful Login</a:t>
-            </a:r>
-            <a:endParaRPr lang="en-US" dirty="0"/>
-          </a:p>
-        </p:txBody>
-      </p:sp>
-      <p:pic>
-        <p:nvPicPr>
-          <p:cNvPr id="3" name="Picture 2"/>
-          <p:cNvPicPr>
-            <a:picLocks noChangeAspect="1" noChangeArrowheads="1"/>
-          </p:cNvPicPr>
-          <p:nvPr/>
-        </p:nvPicPr>
-        <p:blipFill>
-          <a:blip r:embed="rId2"/>
-          <a:srcRect/>
-          <a:stretch>
-            <a:fillRect/>
-          </a:stretch>
-        </p:blipFill>
-        <p:spPr bwMode="auto">
-          <a:xfrm>
-            <a:off x="234950" y="1371600"/>
-            <a:ext cx="8674100" cy="4572000"/>
-          </a:xfrm>
-          <a:prstGeom prst="rect">
-            <a:avLst/>
-          </a:prstGeom>
-          <a:noFill/>
-          <a:ln w="9525">
-            <a:noFill/>
-            <a:miter lim="800000"/>
-            <a:headEnd/>
-            <a:tailEnd/>
-          </a:ln>
-          <a:effectLst/>
-        </p:spPr>
-      </p:pic>
-    </p:spTree>
-  </p:cSld>
-  <p:clrMapOvr>
-    <a:masterClrMapping/>
-  </p:clrMapOvr>
-  <p:timing>
-    <p:tnLst>
-      <p:par>
-        <p:cTn id="1" dur="indefinite" restart="never" nodeType="tmRoot"/>
-      </p:par>
-    </p:tnLst>
-  </p:timing>
-</p:sld>
-</file>
-
-<file path=ppt/slides/slide12.xml><?xml version="1.0" encoding="utf-8"?>
-<p:sld xmlns:a="http://schemas.openxmlformats.org/drawingml/2006/main" xmlns:r="http://schemas.openxmlformats.org/officeDocument/2006/relationships" xmlns:p="http://schemas.openxmlformats.org/presentationml/2006/main">
-  <p:cSld>
-    <p:spTree>
-      <p:nvGrpSpPr>
-        <p:cNvPr id="1" name=""/>
-        <p:cNvGrpSpPr/>
-        <p:nvPr/>
-      </p:nvGrpSpPr>
-      <p:grpSpPr>
-        <a:xfrm>
-          <a:off x="0" y="0"/>
-          <a:ext cx="0" cy="0"/>
-          <a:chOff x="0" y="0"/>
-          <a:chExt cx="0" cy="0"/>
-        </a:xfrm>
-      </p:grpSpPr>
-      <p:sp>
-        <p:nvSpPr>
-          <p:cNvPr id="2" name="Title 1"/>
-          <p:cNvSpPr>
-            <a:spLocks noGrp="1"/>
-          </p:cNvSpPr>
-          <p:nvPr>
-            <p:ph type="title"/>
-          </p:nvPr>
-        </p:nvSpPr>
-        <p:spPr/>
-        <p:txBody>
-          <a:bodyPr/>
-          <a:lstStyle/>
-          <a:p>
-            <a:r>
-              <a:rPr lang="en-US" dirty="0" smtClean="0"/>
-              <a:t>API Root shows Default Router</a:t>
-            </a:r>
-            <a:endParaRPr lang="en-US" dirty="0"/>
-          </a:p>
-        </p:txBody>
-      </p:sp>
-      <p:pic>
-        <p:nvPicPr>
-          <p:cNvPr id="5122" name="Picture 2"/>
-          <p:cNvPicPr>
-            <a:picLocks noChangeAspect="1" noChangeArrowheads="1"/>
-          </p:cNvPicPr>
-          <p:nvPr/>
-        </p:nvPicPr>
-        <p:blipFill>
-          <a:blip r:embed="rId2"/>
-          <a:srcRect/>
-          <a:stretch>
-            <a:fillRect/>
-          </a:stretch>
-        </p:blipFill>
-        <p:spPr bwMode="auto">
-          <a:xfrm>
-            <a:off x="234950" y="1371600"/>
-            <a:ext cx="8674100" cy="4572000"/>
-          </a:xfrm>
-          <a:prstGeom prst="rect">
-            <a:avLst/>
-          </a:prstGeom>
-          <a:noFill/>
-          <a:ln w="9525">
-            <a:noFill/>
-            <a:miter lim="800000"/>
-            <a:headEnd/>
-            <a:tailEnd/>
-          </a:ln>
-          <a:effectLst/>
-        </p:spPr>
-      </p:pic>
-    </p:spTree>
-  </p:cSld>
-  <p:clrMapOvr>
-    <a:masterClrMapping/>
-  </p:clrMapOvr>
-  <p:timing>
-    <p:tnLst>
-      <p:par>
-        <p:cTn id="1" dur="indefinite" restart="never" nodeType="tmRoot"/>
-      </p:par>
-    </p:tnLst>
-  </p:timing>
-</p:sld>
-</file>
-
-<file path=ppt/slides/slide13.xml><?xml version="1.0" encoding="utf-8"?>
-<p:sld xmlns:a="http://schemas.openxmlformats.org/drawingml/2006/main" xmlns:r="http://schemas.openxmlformats.org/officeDocument/2006/relationships" xmlns:p="http://schemas.openxmlformats.org/presentationml/2006/main">
-  <p:cSld>
-    <p:spTree>
-      <p:nvGrpSpPr>
-        <p:cNvPr id="1" name=""/>
-        <p:cNvGrpSpPr/>
-        <p:nvPr/>
-      </p:nvGrpSpPr>
-      <p:grpSpPr>
-        <a:xfrm>
-          <a:off x="0" y="0"/>
-          <a:ext cx="0" cy="0"/>
-          <a:chOff x="0" y="0"/>
-          <a:chExt cx="0" cy="0"/>
-        </a:xfrm>
-      </p:grpSpPr>
-      <p:sp>
-        <p:nvSpPr>
-          <p:cNvPr id="2" name="Title 1"/>
-          <p:cNvSpPr>
-            <a:spLocks noGrp="1"/>
-          </p:cNvSpPr>
-          <p:nvPr>
-            <p:ph type="title"/>
-          </p:nvPr>
-        </p:nvSpPr>
-        <p:spPr/>
-        <p:txBody>
-          <a:bodyPr/>
-          <a:lstStyle/>
-          <a:p>
-            <a:r>
-              <a:rPr lang="en-US" dirty="0" smtClean="0"/>
-              <a:t>Posting </a:t>
-            </a:r>
-            <a:r>
-              <a:rPr lang="en-US" dirty="0" err="1" smtClean="0"/>
-              <a:t>RiskType</a:t>
-            </a:r>
-            <a:r>
-              <a:rPr lang="en-US" dirty="0" smtClean="0"/>
-              <a:t> successfully</a:t>
-            </a:r>
-            <a:endParaRPr lang="en-US" dirty="0"/>
-          </a:p>
-        </p:txBody>
-      </p:sp>
-      <p:pic>
-        <p:nvPicPr>
-          <p:cNvPr id="6146" name="Picture 2"/>
-          <p:cNvPicPr>
-            <a:picLocks noChangeAspect="1" noChangeArrowheads="1"/>
-          </p:cNvPicPr>
-          <p:nvPr/>
-        </p:nvPicPr>
-        <p:blipFill>
-          <a:blip r:embed="rId2"/>
-          <a:srcRect/>
-          <a:stretch>
-            <a:fillRect/>
-          </a:stretch>
-        </p:blipFill>
-        <p:spPr bwMode="auto">
-          <a:xfrm>
-            <a:off x="234950" y="1600200"/>
-            <a:ext cx="8674100" cy="4572000"/>
-          </a:xfrm>
-          <a:prstGeom prst="rect">
-            <a:avLst/>
-          </a:prstGeom>
-          <a:noFill/>
-          <a:ln w="9525">
-            <a:noFill/>
-            <a:miter lim="800000"/>
-            <a:headEnd/>
-            <a:tailEnd/>
-          </a:ln>
-          <a:effectLst/>
-        </p:spPr>
-      </p:pic>
-    </p:spTree>
-  </p:cSld>
-  <p:clrMapOvr>
-    <a:masterClrMapping/>
-  </p:clrMapOvr>
-  <p:timing>
-    <p:tnLst>
-      <p:par>
-        <p:cTn id="1" dur="indefinite" restart="never" nodeType="tmRoot"/>
-      </p:par>
-    </p:tnLst>
-  </p:timing>
-</p:sld>
-</file>
-
-<file path=ppt/slides/slide14.xml><?xml version="1.0" encoding="utf-8"?>
-<p:sld xmlns:a="http://schemas.openxmlformats.org/drawingml/2006/main" xmlns:r="http://schemas.openxmlformats.org/officeDocument/2006/relationships" xmlns:p="http://schemas.openxmlformats.org/presentationml/2006/main">
-  <p:cSld>
-    <p:spTree>
-      <p:nvGrpSpPr>
-        <p:cNvPr id="1" name=""/>
-        <p:cNvGrpSpPr/>
-        <p:nvPr/>
-      </p:nvGrpSpPr>
-      <p:grpSpPr>
-        <a:xfrm>
-          <a:off x="0" y="0"/>
-          <a:ext cx="0" cy="0"/>
-          <a:chOff x="0" y="0"/>
-          <a:chExt cx="0" cy="0"/>
-        </a:xfrm>
-      </p:grpSpPr>
-      <p:sp>
-        <p:nvSpPr>
-          <p:cNvPr id="2" name="Title 1"/>
-          <p:cNvSpPr>
-            <a:spLocks noGrp="1"/>
-          </p:cNvSpPr>
-          <p:nvPr>
-            <p:ph type="title"/>
-          </p:nvPr>
-        </p:nvSpPr>
-        <p:spPr/>
-        <p:txBody>
-          <a:bodyPr/>
-          <a:lstStyle/>
-          <a:p>
-            <a:r>
-              <a:rPr lang="en-US" dirty="0" smtClean="0"/>
-              <a:t>Posting Risk Instance</a:t>
-            </a:r>
-            <a:endParaRPr lang="en-US" dirty="0"/>
-          </a:p>
-        </p:txBody>
-      </p:sp>
-      <p:pic>
-        <p:nvPicPr>
-          <p:cNvPr id="7170" name="Picture 2"/>
-          <p:cNvPicPr>
-            <a:picLocks noChangeAspect="1" noChangeArrowheads="1"/>
-          </p:cNvPicPr>
-          <p:nvPr/>
-        </p:nvPicPr>
-        <p:blipFill>
-          <a:blip r:embed="rId2"/>
-          <a:srcRect/>
-          <a:stretch>
-            <a:fillRect/>
-          </a:stretch>
-        </p:blipFill>
-        <p:spPr bwMode="auto">
-          <a:xfrm>
-            <a:off x="234950" y="1295400"/>
-            <a:ext cx="8674100" cy="4572000"/>
-          </a:xfrm>
-          <a:prstGeom prst="rect">
-            <a:avLst/>
-          </a:prstGeom>
-          <a:noFill/>
-          <a:ln w="9525">
-            <a:noFill/>
-            <a:miter lim="800000"/>
-            <a:headEnd/>
-            <a:tailEnd/>
-          </a:ln>
-          <a:effectLst/>
-        </p:spPr>
-      </p:pic>
-    </p:spTree>
-  </p:cSld>
-  <p:clrMapOvr>
-    <a:masterClrMapping/>
-  </p:clrMapOvr>
-  <p:timing>
-    <p:tnLst>
-      <p:par>
-        <p:cTn id="1" dur="indefinite" restart="never" nodeType="tmRoot"/>
-      </p:par>
-    </p:tnLst>
-  </p:timing>
-</p:sld>
-</file>
-
-<file path=ppt/slides/slide15.xml><?xml version="1.0" encoding="utf-8"?>
-<p:sld xmlns:a="http://schemas.openxmlformats.org/drawingml/2006/main" xmlns:r="http://schemas.openxmlformats.org/officeDocument/2006/relationships" xmlns:p="http://schemas.openxmlformats.org/presentationml/2006/main">
-  <p:cSld>
-    <p:spTree>
-      <p:nvGrpSpPr>
-        <p:cNvPr id="1" name=""/>
-        <p:cNvGrpSpPr/>
-        <p:nvPr/>
-      </p:nvGrpSpPr>
-      <p:grpSpPr>
-        <a:xfrm>
-          <a:off x="0" y="0"/>
-          <a:ext cx="0" cy="0"/>
-          <a:chOff x="0" y="0"/>
-          <a:chExt cx="0" cy="0"/>
-        </a:xfrm>
-      </p:grpSpPr>
-      <p:sp>
-        <p:nvSpPr>
-          <p:cNvPr id="2" name="Title 1"/>
-          <p:cNvSpPr>
-            <a:spLocks noGrp="1"/>
-          </p:cNvSpPr>
-          <p:nvPr>
-            <p:ph type="title"/>
-          </p:nvPr>
-        </p:nvSpPr>
-        <p:spPr/>
-        <p:txBody>
-          <a:bodyPr/>
-          <a:lstStyle/>
-          <a:p>
-            <a:r>
-              <a:rPr lang="en-US" dirty="0" smtClean="0"/>
-              <a:t>Get </a:t>
-            </a:r>
-            <a:r>
-              <a:rPr lang="en-US" dirty="0" err="1" smtClean="0"/>
-              <a:t>RiskTypeKeys</a:t>
-            </a:r>
-            <a:endParaRPr lang="en-US" dirty="0"/>
-          </a:p>
-        </p:txBody>
-      </p:sp>
-      <p:pic>
-        <p:nvPicPr>
-          <p:cNvPr id="8194" name="Picture 2"/>
-          <p:cNvPicPr>
-            <a:picLocks noChangeAspect="1" noChangeArrowheads="1"/>
-          </p:cNvPicPr>
-          <p:nvPr/>
-        </p:nvPicPr>
-        <p:blipFill>
-          <a:blip r:embed="rId2"/>
-          <a:srcRect/>
-          <a:stretch>
-            <a:fillRect/>
-          </a:stretch>
-        </p:blipFill>
-        <p:spPr bwMode="auto">
-          <a:xfrm>
-            <a:off x="234950" y="1295400"/>
-            <a:ext cx="8674100" cy="4572000"/>
-          </a:xfrm>
-          <a:prstGeom prst="rect">
-            <a:avLst/>
-          </a:prstGeom>
-          <a:noFill/>
-          <a:ln w="9525">
-            <a:noFill/>
-            <a:miter lim="800000"/>
-            <a:headEnd/>
-            <a:tailEnd/>
-          </a:ln>
-          <a:effectLst/>
-        </p:spPr>
-      </p:pic>
-    </p:spTree>
-  </p:cSld>
-  <p:clrMapOvr>
-    <a:masterClrMapping/>
-  </p:clrMapOvr>
-  <p:timing>
-    <p:tnLst>
-      <p:par>
-        <p:cTn id="1" dur="indefinite" restart="never" nodeType="tmRoot"/>
-      </p:par>
-    </p:tnLst>
-  </p:timing>
-</p:sld>
-</file>
-
-<file path=ppt/slides/slide16.xml><?xml version="1.0" encoding="utf-8"?>
-<p:sld xmlns:a="http://schemas.openxmlformats.org/drawingml/2006/main" xmlns:r="http://schemas.openxmlformats.org/officeDocument/2006/relationships" xmlns:p="http://schemas.openxmlformats.org/presentationml/2006/main">
-  <p:cSld>
-    <p:spTree>
-      <p:nvGrpSpPr>
-        <p:cNvPr id="1" name=""/>
-        <p:cNvGrpSpPr/>
-        <p:nvPr/>
-      </p:nvGrpSpPr>
-      <p:grpSpPr>
-        <a:xfrm>
-          <a:off x="0" y="0"/>
-          <a:ext cx="0" cy="0"/>
-          <a:chOff x="0" y="0"/>
-          <a:chExt cx="0" cy="0"/>
-        </a:xfrm>
-      </p:grpSpPr>
-      <p:sp>
-        <p:nvSpPr>
-          <p:cNvPr id="2" name="Title 1"/>
-          <p:cNvSpPr>
-            <a:spLocks noGrp="1"/>
-          </p:cNvSpPr>
-          <p:nvPr>
-            <p:ph type="title"/>
-          </p:nvPr>
-        </p:nvSpPr>
-        <p:spPr/>
-        <p:txBody>
-          <a:bodyPr/>
-          <a:lstStyle/>
-          <a:p>
-            <a:r>
-              <a:rPr lang="en-US" dirty="0" smtClean="0"/>
-              <a:t>Get Risk Key List</a:t>
-            </a:r>
-            <a:endParaRPr lang="en-US" dirty="0"/>
-          </a:p>
-        </p:txBody>
-      </p:sp>
-      <p:pic>
-        <p:nvPicPr>
-          <p:cNvPr id="9218" name="Picture 2"/>
-          <p:cNvPicPr>
-            <a:picLocks noChangeAspect="1" noChangeArrowheads="1"/>
-          </p:cNvPicPr>
-          <p:nvPr/>
-        </p:nvPicPr>
-        <p:blipFill>
-          <a:blip r:embed="rId2"/>
-          <a:srcRect/>
-          <a:stretch>
-            <a:fillRect/>
-          </a:stretch>
-        </p:blipFill>
-        <p:spPr bwMode="auto">
-          <a:xfrm>
-            <a:off x="234950" y="1371600"/>
-            <a:ext cx="8674100" cy="4572000"/>
-          </a:xfrm>
-          <a:prstGeom prst="rect">
-            <a:avLst/>
-          </a:prstGeom>
-          <a:noFill/>
-          <a:ln w="9525">
-            <a:noFill/>
-            <a:miter lim="800000"/>
-            <a:headEnd/>
-            <a:tailEnd/>
-          </a:ln>
-          <a:effectLst/>
-        </p:spPr>
-      </p:pic>
-    </p:spTree>
-  </p:cSld>
-  <p:clrMapOvr>
-    <a:masterClrMapping/>
-  </p:clrMapOvr>
-  <p:timing>
-    <p:tnLst>
-      <p:par>
-        <p:cTn id="1" dur="indefinite" restart="never" nodeType="tmRoot"/>
-      </p:par>
-    </p:tnLst>
-  </p:timing>
-</p:sld>
-</file>
-
-<file path=ppt/slides/slide17.xml><?xml version="1.0" encoding="utf-8"?>
-<p:sld xmlns:a="http://schemas.openxmlformats.org/drawingml/2006/main" xmlns:r="http://schemas.openxmlformats.org/officeDocument/2006/relationships" xmlns:p="http://schemas.openxmlformats.org/presentationml/2006/main">
-  <p:cSld>
-    <p:spTree>
-      <p:nvGrpSpPr>
-        <p:cNvPr id="1" name=""/>
-        <p:cNvGrpSpPr/>
-        <p:nvPr/>
-      </p:nvGrpSpPr>
-      <p:grpSpPr>
-        <a:xfrm>
-          <a:off x="0" y="0"/>
-          <a:ext cx="0" cy="0"/>
-          <a:chOff x="0" y="0"/>
-          <a:chExt cx="0" cy="0"/>
-        </a:xfrm>
-      </p:grpSpPr>
-      <p:sp>
-        <p:nvSpPr>
-          <p:cNvPr id="2" name="Title 1"/>
-          <p:cNvSpPr>
-            <a:spLocks noGrp="1"/>
-          </p:cNvSpPr>
-          <p:nvPr>
-            <p:ph type="title"/>
-          </p:nvPr>
-        </p:nvSpPr>
-        <p:spPr/>
-        <p:txBody>
-          <a:bodyPr>
-            <a:normAutofit fontScale="90000"/>
-          </a:bodyPr>
-          <a:lstStyle/>
-          <a:p>
-            <a:r>
-              <a:rPr lang="en-US" dirty="0" smtClean="0">
-                <a:hlinkClick r:id="rId2"/>
-              </a:rPr>
-              <a:t>https://britecore-poc-server-session.herokuapp.com/docs/</a:t>
-            </a:r>
-            <a:endParaRPr lang="en-US" dirty="0"/>
-          </a:p>
-        </p:txBody>
-      </p:sp>
-      <p:pic>
-        <p:nvPicPr>
-          <p:cNvPr id="5122" name="Picture 2"/>
-          <p:cNvPicPr>
-            <a:picLocks noGrp="1" noChangeAspect="1" noChangeArrowheads="1"/>
-          </p:cNvPicPr>
-          <p:nvPr>
-            <p:ph idx="1"/>
-          </p:nvPr>
-        </p:nvPicPr>
-        <p:blipFill>
-          <a:blip r:embed="rId3"/>
-          <a:srcRect/>
-          <a:stretch>
-            <a:fillRect/>
-          </a:stretch>
-        </p:blipFill>
-        <p:spPr bwMode="auto">
-          <a:xfrm>
-            <a:off x="457200" y="1694326"/>
-            <a:ext cx="8229600" cy="4337710"/>
-          </a:xfrm>
-          <a:prstGeom prst="rect">
-            <a:avLst/>
-          </a:prstGeom>
-          <a:noFill/>
-          <a:ln w="9525">
-            <a:noFill/>
-            <a:miter lim="800000"/>
-            <a:headEnd/>
-            <a:tailEnd/>
-          </a:ln>
-          <a:effectLst/>
-        </p:spPr>
-      </p:pic>
-    </p:spTree>
-  </p:cSld>
-  <p:clrMapOvr>
-    <a:masterClrMapping/>
-  </p:clrMapOvr>
-  <p:timing>
-    <p:tnLst>
-      <p:par>
-        <p:cTn id="1" dur="indefinite" restart="never" nodeType="tmRoot"/>
-      </p:par>
-    </p:tnLst>
-  </p:timing>
-</p:sld>
-</file>
-
-<file path=ppt/slides/slide18.xml><?xml version="1.0" encoding="utf-8"?>
-<p:sld xmlns:a="http://schemas.openxmlformats.org/drawingml/2006/main" xmlns:r="http://schemas.openxmlformats.org/officeDocument/2006/relationships" xmlns:p="http://schemas.openxmlformats.org/presentationml/2006/main">
-  <p:cSld>
-    <p:spTree>
-      <p:nvGrpSpPr>
-        <p:cNvPr id="1" name=""/>
-        <p:cNvGrpSpPr/>
-        <p:nvPr/>
-      </p:nvGrpSpPr>
-      <p:grpSpPr>
-        <a:xfrm>
-          <a:off x="0" y="0"/>
-          <a:ext cx="0" cy="0"/>
-          <a:chOff x="0" y="0"/>
-          <a:chExt cx="0" cy="0"/>
-        </a:xfrm>
-      </p:grpSpPr>
-      <p:sp>
-        <p:nvSpPr>
-          <p:cNvPr id="2" name="Title 1"/>
-          <p:cNvSpPr>
-            <a:spLocks noGrp="1"/>
-          </p:cNvSpPr>
-          <p:nvPr>
-            <p:ph type="title"/>
-          </p:nvPr>
-        </p:nvSpPr>
-        <p:spPr/>
-        <p:txBody>
-          <a:bodyPr>
-            <a:normAutofit fontScale="90000"/>
-          </a:bodyPr>
-          <a:lstStyle/>
-          <a:p>
-            <a:r>
-              <a:rPr lang="en-US" dirty="0" smtClean="0">
-                <a:hlinkClick r:id="rId2"/>
-              </a:rPr>
-              <a:t>https://britecore-poc-server-session.herokuapp.com/schema </a:t>
-            </a:r>
-            <a:r>
-              <a:rPr lang="en-US" dirty="0" smtClean="0">
-                <a:hlinkClick r:id="rId2"/>
-              </a:rPr>
-              <a:t>/</a:t>
-            </a:r>
-            <a:endParaRPr lang="en-US" dirty="0"/>
-          </a:p>
-        </p:txBody>
-      </p:sp>
-      <p:pic>
-        <p:nvPicPr>
-          <p:cNvPr id="2050" name="Picture 2"/>
-          <p:cNvPicPr>
-            <a:picLocks noChangeAspect="1" noChangeArrowheads="1"/>
-          </p:cNvPicPr>
-          <p:nvPr/>
-        </p:nvPicPr>
-        <p:blipFill>
-          <a:blip r:embed="rId3"/>
-          <a:srcRect/>
-          <a:stretch>
-            <a:fillRect/>
-          </a:stretch>
-        </p:blipFill>
-        <p:spPr bwMode="auto">
-          <a:xfrm>
-            <a:off x="234950" y="1752600"/>
-            <a:ext cx="8674100" cy="4572000"/>
-          </a:xfrm>
-          <a:prstGeom prst="rect">
-            <a:avLst/>
-          </a:prstGeom>
-          <a:noFill/>
-          <a:ln w="9525">
-            <a:noFill/>
-            <a:miter lim="800000"/>
-            <a:headEnd/>
-            <a:tailEnd/>
-          </a:ln>
-          <a:effectLst/>
-        </p:spPr>
-      </p:pic>
-    </p:spTree>
-  </p:cSld>
-  <p:clrMapOvr>
-    <a:masterClrMapping/>
-  </p:clrMapOvr>
-  <p:timing>
-    <p:tnLst>
-      <p:par>
-        <p:cTn id="1" dur="indefinite" restart="never" nodeType="tmRoot"/>
-      </p:par>
-    </p:tnLst>
-  </p:timing>
-</p:sld>
-</file>
-
-<file path=ppt/slides/slide2.xml><?xml version="1.0" encoding="utf-8"?>
-<p:sld xmlns:a="http://schemas.openxmlformats.org/drawingml/2006/main" xmlns:r="http://schemas.openxmlformats.org/officeDocument/2006/relationships" xmlns:p="http://schemas.openxmlformats.org/presentationml/2006/main">
-  <p:cSld>
-    <p:spTree>
-      <p:nvGrpSpPr>
-        <p:cNvPr id="1" name=""/>
-        <p:cNvGrpSpPr/>
-        <p:nvPr/>
-      </p:nvGrpSpPr>
-      <p:grpSpPr>
-        <a:xfrm>
-          <a:off x="0" y="0"/>
-          <a:ext cx="0" cy="0"/>
-          <a:chOff x="0" y="0"/>
-          <a:chExt cx="0" cy="0"/>
-        </a:xfrm>
-      </p:grpSpPr>
-      <p:sp>
-        <p:nvSpPr>
-          <p:cNvPr id="2" name="Title 1"/>
-          <p:cNvSpPr>
-            <a:spLocks noGrp="1"/>
-          </p:cNvSpPr>
-          <p:nvPr>
-            <p:ph type="title"/>
-          </p:nvPr>
-        </p:nvSpPr>
-        <p:spPr/>
-        <p:txBody>
-          <a:bodyPr/>
-          <a:lstStyle/>
-          <a:p>
-            <a:r>
-              <a:rPr lang="en-US" dirty="0" smtClean="0"/>
-              <a:t>Source code</a:t>
-            </a:r>
-            <a:endParaRPr lang="en-US" dirty="0"/>
-          </a:p>
-        </p:txBody>
-      </p:sp>
-      <p:sp>
-        <p:nvSpPr>
-          <p:cNvPr id="3" name="Content Placeholder 2"/>
-          <p:cNvSpPr>
-            <a:spLocks noGrp="1"/>
-          </p:cNvSpPr>
-          <p:nvPr>
-            <p:ph idx="1"/>
-          </p:nvPr>
-        </p:nvSpPr>
-        <p:spPr/>
-        <p:txBody>
-          <a:bodyPr/>
-          <a:lstStyle/>
-          <a:p>
-            <a:r>
-              <a:rPr lang="en-US" dirty="0" smtClean="0">
-                <a:hlinkClick r:id="rId2"/>
-              </a:rPr>
-              <a:t>https://github.com/MaheshBodas/britecore-poc-api-master</a:t>
-            </a:r>
-            <a:endParaRPr lang="en-US" dirty="0"/>
-          </a:p>
-        </p:txBody>
-      </p:sp>
-    </p:spTree>
-  </p:cSld>
-  <p:clrMapOvr>
-    <a:masterClrMapping/>
-  </p:clrMapOvr>
-  <p:timing>
-    <p:tnLst>
-      <p:par>
-        <p:cTn id="1" dur="indefinite" restart="never" nodeType="tmRoot"/>
-      </p:par>
-    </p:tnLst>
-  </p:timing>
-</p:sld>
-</file>
-
-<file path=ppt/slides/slide3.xml><?xml version="1.0" encoding="utf-8"?>
-<p:sld xmlns:a="http://schemas.openxmlformats.org/drawingml/2006/main" xmlns:r="http://schemas.openxmlformats.org/officeDocument/2006/relationships" xmlns:p="http://schemas.openxmlformats.org/presentationml/2006/main">
-  <p:cSld>
-    <p:spTree>
-      <p:nvGrpSpPr>
-        <p:cNvPr id="1" name=""/>
-        <p:cNvGrpSpPr/>
-        <p:nvPr/>
-      </p:nvGrpSpPr>
-      <p:grpSpPr>
-        <a:xfrm>
-          <a:off x="0" y="0"/>
-          <a:ext cx="0" cy="0"/>
-          <a:chOff x="0" y="0"/>
-          <a:chExt cx="0" cy="0"/>
-        </a:xfrm>
-      </p:grpSpPr>
-      <p:sp>
-        <p:nvSpPr>
-          <p:cNvPr id="2" name="Title 1"/>
-          <p:cNvSpPr>
-            <a:spLocks noGrp="1"/>
-          </p:cNvSpPr>
-          <p:nvPr>
-            <p:ph type="title"/>
-          </p:nvPr>
-        </p:nvSpPr>
-        <p:spPr/>
-        <p:txBody>
-          <a:bodyPr/>
-          <a:lstStyle/>
-          <a:p>
-            <a:r>
-              <a:rPr lang="en-US" dirty="0" smtClean="0"/>
-              <a:t>Salient features</a:t>
-            </a:r>
-            <a:endParaRPr lang="en-US" dirty="0"/>
-          </a:p>
-        </p:txBody>
-      </p:sp>
-      <p:sp>
-        <p:nvSpPr>
-          <p:cNvPr id="3" name="Content Placeholder 2"/>
-          <p:cNvSpPr>
-            <a:spLocks noGrp="1"/>
-          </p:cNvSpPr>
-          <p:nvPr>
-            <p:ph idx="1"/>
-          </p:nvPr>
-        </p:nvSpPr>
-        <p:spPr/>
-        <p:txBody>
-          <a:bodyPr>
-            <a:normAutofit fontScale="85000" lnSpcReduction="10000"/>
-          </a:bodyPr>
-          <a:lstStyle/>
-          <a:p>
-            <a:r>
-              <a:rPr lang="en-US" dirty="0" smtClean="0"/>
-              <a:t>Solution </a:t>
-            </a:r>
-            <a:r>
-              <a:rPr lang="en-US" dirty="0" smtClean="0"/>
-              <a:t>that allows insurers to define their own custom data model for their risks. There are no database tables called automobiles, houses, or prizes. Instead, insurers will be able to create their own risk types and attach as many different fields as they would like</a:t>
-            </a:r>
-            <a:r>
-              <a:rPr lang="en-US" dirty="0" smtClean="0"/>
-              <a:t>.</a:t>
-            </a:r>
-          </a:p>
-          <a:p>
-            <a:r>
-              <a:rPr lang="en-US" dirty="0" smtClean="0"/>
-              <a:t>Fields are bits of data like first name, age, zip code, model, serial number, Coverage A limit, or prize dollar amount. Basically any data the carrier would want to collect about the risk. Fields can also be of different types, like text, date, number, currency, and so forth.</a:t>
-            </a:r>
-            <a:endParaRPr lang="en-US" dirty="0"/>
-          </a:p>
-        </p:txBody>
-      </p:sp>
-    </p:spTree>
-  </p:cSld>
-  <p:clrMapOvr>
-    <a:masterClrMapping/>
-  </p:clrMapOvr>
-  <p:timing>
-    <p:tnLst>
-      <p:par>
-        <p:cTn id="1" dur="indefinite" restart="never" nodeType="tmRoot"/>
-      </p:par>
-    </p:tnLst>
-  </p:timing>
-</p:sld>
-</file>
-
-<file path=ppt/slides/slide4.xml><?xml version="1.0" encoding="utf-8"?>
-<p:sld xmlns:a="http://schemas.openxmlformats.org/drawingml/2006/main" xmlns:r="http://schemas.openxmlformats.org/officeDocument/2006/relationships" xmlns:p="http://schemas.openxmlformats.org/presentationml/2006/main">
-  <p:cSld>
-    <p:spTree>
-      <p:nvGrpSpPr>
-        <p:cNvPr id="1" name=""/>
-        <p:cNvGrpSpPr/>
-        <p:nvPr/>
-      </p:nvGrpSpPr>
-      <p:grpSpPr>
-        <a:xfrm>
-          <a:off x="0" y="0"/>
-          <a:ext cx="0" cy="0"/>
-          <a:chOff x="0" y="0"/>
-          <a:chExt cx="0" cy="0"/>
-        </a:xfrm>
-      </p:grpSpPr>
-      <p:sp>
-        <p:nvSpPr>
-          <p:cNvPr id="2" name="Title 1"/>
-          <p:cNvSpPr>
-            <a:spLocks noGrp="1"/>
-          </p:cNvSpPr>
-          <p:nvPr>
-            <p:ph type="title"/>
-          </p:nvPr>
-        </p:nvSpPr>
-        <p:spPr/>
-        <p:txBody>
-          <a:bodyPr/>
-          <a:lstStyle/>
-          <a:p>
-            <a:r>
-              <a:rPr lang="en-US" dirty="0" smtClean="0"/>
-              <a:t>Salient </a:t>
-            </a:r>
-            <a:r>
-              <a:rPr lang="en-US" dirty="0" smtClean="0"/>
-              <a:t>features (continued)</a:t>
-            </a:r>
-            <a:endParaRPr lang="en-US" dirty="0"/>
-          </a:p>
-        </p:txBody>
-      </p:sp>
-      <p:sp>
-        <p:nvSpPr>
-          <p:cNvPr id="3" name="Content Placeholder 2"/>
-          <p:cNvSpPr>
-            <a:spLocks noGrp="1"/>
-          </p:cNvSpPr>
-          <p:nvPr>
-            <p:ph idx="1"/>
-          </p:nvPr>
-        </p:nvSpPr>
-        <p:spPr/>
-        <p:txBody>
-          <a:bodyPr>
-            <a:normAutofit fontScale="85000" lnSpcReduction="10000"/>
-          </a:bodyPr>
-          <a:lstStyle/>
-          <a:p>
-            <a:r>
-              <a:rPr lang="en-US" dirty="0" smtClean="0"/>
-              <a:t>As risk field types are user defined and not </a:t>
-            </a:r>
-            <a:r>
-              <a:rPr lang="en-US" dirty="0" err="1" smtClean="0"/>
-              <a:t>commited</a:t>
-            </a:r>
-            <a:r>
-              <a:rPr lang="en-US" dirty="0" smtClean="0"/>
-              <a:t> at time of table creation. Actual field/column value stored in table is string type. But field type sanctity is enforced using model </a:t>
-            </a:r>
-            <a:r>
-              <a:rPr lang="en-US" dirty="0" err="1" smtClean="0"/>
-              <a:t>validators</a:t>
-            </a:r>
-            <a:r>
-              <a:rPr lang="en-US" dirty="0" smtClean="0"/>
-              <a:t>. </a:t>
-            </a:r>
-            <a:r>
-              <a:rPr lang="en-US" dirty="0" err="1" smtClean="0"/>
-              <a:t>i.e</a:t>
-            </a:r>
-            <a:r>
-              <a:rPr lang="en-US" dirty="0" smtClean="0"/>
-              <a:t> User can not supply Date value where Currency is expected</a:t>
-            </a:r>
-            <a:r>
-              <a:rPr lang="en-US" dirty="0" smtClean="0"/>
-              <a:t>.</a:t>
-            </a:r>
-          </a:p>
-          <a:p>
-            <a:r>
-              <a:rPr lang="en-US" dirty="0" err="1" smtClean="0"/>
-              <a:t>Uniqness</a:t>
-            </a:r>
-            <a:r>
-              <a:rPr lang="en-US" dirty="0" smtClean="0"/>
-              <a:t> among </a:t>
-            </a:r>
-            <a:r>
-              <a:rPr lang="en-US" dirty="0" err="1" smtClean="0"/>
-              <a:t>RiskType</a:t>
-            </a:r>
-            <a:r>
-              <a:rPr lang="en-US" dirty="0" smtClean="0"/>
-              <a:t> names is maintained by enforcing unique constrain. But enforcing unique risk field name in similar fashion is somewhat restrictive and naive. I have tried to maintain unique field name within Risk Types and not across all Risk Type using mode </a:t>
-            </a:r>
-            <a:r>
-              <a:rPr lang="en-US" dirty="0" err="1" smtClean="0"/>
-              <a:t>validators</a:t>
-            </a:r>
-            <a:r>
-              <a:rPr lang="en-US" dirty="0" smtClean="0"/>
-              <a:t>.</a:t>
-            </a:r>
-            <a:endParaRPr lang="en-US" dirty="0"/>
-          </a:p>
-        </p:txBody>
-      </p:sp>
-    </p:spTree>
-  </p:cSld>
-  <p:clrMapOvr>
-    <a:masterClrMapping/>
-  </p:clrMapOvr>
-  <p:timing>
-    <p:tnLst>
-      <p:par>
-        <p:cTn id="1" dur="indefinite" restart="never" nodeType="tmRoot"/>
-      </p:par>
-    </p:tnLst>
-  </p:timing>
-</p:sld>
-</file>
-
-<file path=ppt/slides/slide5.xml><?xml version="1.0" encoding="utf-8"?>
-<p:sld xmlns:a="http://schemas.openxmlformats.org/drawingml/2006/main" xmlns:r="http://schemas.openxmlformats.org/officeDocument/2006/relationships" xmlns:p="http://schemas.openxmlformats.org/presentationml/2006/main">
-  <p:cSld>
-    <p:spTree>
-      <p:nvGrpSpPr>
-        <p:cNvPr id="1" name=""/>
-        <p:cNvGrpSpPr/>
-        <p:nvPr/>
-      </p:nvGrpSpPr>
-      <p:grpSpPr>
-        <a:xfrm>
-          <a:off x="0" y="0"/>
-          <a:ext cx="0" cy="0"/>
-          <a:chOff x="0" y="0"/>
-          <a:chExt cx="0" cy="0"/>
-        </a:xfrm>
-      </p:grpSpPr>
-      <p:sp>
-        <p:nvSpPr>
-          <p:cNvPr id="2" name="Title 1"/>
-          <p:cNvSpPr>
-            <a:spLocks noGrp="1"/>
-          </p:cNvSpPr>
-          <p:nvPr>
-            <p:ph type="title"/>
-          </p:nvPr>
-        </p:nvSpPr>
-        <p:spPr/>
-        <p:txBody>
-          <a:bodyPr/>
-          <a:lstStyle/>
-          <a:p>
-            <a:r>
-              <a:rPr lang="en-US" dirty="0" smtClean="0"/>
-              <a:t>Salient features (continued)</a:t>
-            </a:r>
-            <a:endParaRPr lang="en-US" dirty="0"/>
-          </a:p>
-        </p:txBody>
-      </p:sp>
-      <p:sp>
-        <p:nvSpPr>
-          <p:cNvPr id="3" name="Content Placeholder 2"/>
-          <p:cNvSpPr>
-            <a:spLocks noGrp="1"/>
-          </p:cNvSpPr>
-          <p:nvPr>
-            <p:ph idx="1"/>
-          </p:nvPr>
-        </p:nvSpPr>
-        <p:spPr/>
-        <p:txBody>
-          <a:bodyPr>
-            <a:normAutofit fontScale="70000" lnSpcReduction="20000"/>
-          </a:bodyPr>
-          <a:lstStyle/>
-          <a:p>
-            <a:r>
-              <a:rPr lang="en-US" dirty="0" smtClean="0"/>
-              <a:t>During risk and risk field creation  system checks that proper referential integrity is maintained among Risk Type and Risks. Risk Fields ensures that proper referential integrity is maintained with Risk Type and Risk Type fields.</a:t>
-            </a:r>
-          </a:p>
-          <a:p>
-            <a:endParaRPr lang="en-US" dirty="0" smtClean="0"/>
-          </a:p>
-          <a:p>
-            <a:r>
-              <a:rPr lang="en-US" dirty="0" smtClean="0"/>
-              <a:t>Risk API allows users to create </a:t>
-            </a:r>
-            <a:r>
-              <a:rPr lang="en-US" dirty="0" err="1" smtClean="0"/>
-              <a:t>RiskTypes</a:t>
-            </a:r>
-            <a:r>
-              <a:rPr lang="en-US" dirty="0" smtClean="0"/>
-              <a:t> and associated </a:t>
-            </a:r>
-            <a:r>
-              <a:rPr lang="en-US" dirty="0" err="1" smtClean="0"/>
-              <a:t>RiskTypeFields</a:t>
-            </a:r>
-            <a:r>
-              <a:rPr lang="en-US" dirty="0" smtClean="0"/>
-              <a:t> in one go with use of nested </a:t>
-            </a:r>
-            <a:r>
-              <a:rPr lang="en-US" dirty="0" err="1" smtClean="0"/>
-              <a:t>serializer</a:t>
-            </a:r>
-            <a:r>
-              <a:rPr lang="en-US" dirty="0" smtClean="0"/>
-              <a:t>.</a:t>
-            </a:r>
-          </a:p>
-          <a:p>
-            <a:endParaRPr lang="en-US" dirty="0" smtClean="0"/>
-          </a:p>
-          <a:p>
-            <a:r>
-              <a:rPr lang="en-US" dirty="0" smtClean="0"/>
-              <a:t>Risk API allows users to create Risk and associated </a:t>
-            </a:r>
-            <a:r>
-              <a:rPr lang="en-US" dirty="0" err="1" smtClean="0"/>
-              <a:t>RiskFields</a:t>
-            </a:r>
-            <a:r>
-              <a:rPr lang="en-US" dirty="0" smtClean="0"/>
-              <a:t> in one go with use of nested </a:t>
-            </a:r>
-            <a:r>
-              <a:rPr lang="en-US" dirty="0" err="1" smtClean="0"/>
-              <a:t>serializer</a:t>
-            </a:r>
-            <a:r>
-              <a:rPr lang="en-US" dirty="0" smtClean="0"/>
-              <a:t>.</a:t>
-            </a:r>
-          </a:p>
-          <a:p>
-            <a:endParaRPr lang="en-US" dirty="0" smtClean="0"/>
-          </a:p>
-          <a:p>
-            <a:r>
-              <a:rPr lang="en-US" dirty="0" smtClean="0"/>
-              <a:t>Various model validation errors within </a:t>
-            </a:r>
-            <a:r>
-              <a:rPr lang="en-US" dirty="0" err="1" smtClean="0"/>
-              <a:t>RiskType</a:t>
-            </a:r>
-            <a:r>
-              <a:rPr lang="en-US" dirty="0" smtClean="0"/>
-              <a:t> and </a:t>
-            </a:r>
-            <a:r>
-              <a:rPr lang="en-US" dirty="0" err="1" smtClean="0"/>
-              <a:t>RiskTypeFields</a:t>
-            </a:r>
-            <a:r>
-              <a:rPr lang="en-US" dirty="0" smtClean="0"/>
-              <a:t>, Risk and </a:t>
-            </a:r>
-            <a:r>
-              <a:rPr lang="en-US" dirty="0" err="1" smtClean="0"/>
-              <a:t>RiskFields</a:t>
-            </a:r>
-            <a:r>
-              <a:rPr lang="en-US" dirty="0" smtClean="0"/>
-              <a:t> are returned to client of </a:t>
-            </a:r>
-            <a:r>
-              <a:rPr lang="en-US" dirty="0" err="1" smtClean="0"/>
-              <a:t>RiskAPI</a:t>
-            </a:r>
-            <a:r>
-              <a:rPr lang="en-US" dirty="0" smtClean="0"/>
-              <a:t> in JSON format.</a:t>
-            </a:r>
-          </a:p>
-          <a:p>
-            <a:endParaRPr lang="en-US" dirty="0"/>
-          </a:p>
-        </p:txBody>
-      </p:sp>
-    </p:spTree>
-  </p:cSld>
-  <p:clrMapOvr>
-    <a:masterClrMapping/>
-  </p:clrMapOvr>
-  <p:timing>
-    <p:tnLst>
-      <p:par>
-        <p:cTn id="1" dur="indefinite" restart="never" nodeType="tmRoot"/>
-      </p:par>
-    </p:tnLst>
-  </p:timing>
-</p:sld>
-</file>
-
-<file path=ppt/slides/slide6.xml><?xml version="1.0" encoding="utf-8"?>
-<p:sld xmlns:a="http://schemas.openxmlformats.org/drawingml/2006/main" xmlns:r="http://schemas.openxmlformats.org/officeDocument/2006/relationships" xmlns:p="http://schemas.openxmlformats.org/presentationml/2006/main">
-  <p:cSld>
-    <p:spTree>
-      <p:nvGrpSpPr>
-        <p:cNvPr id="1" name=""/>
-        <p:cNvGrpSpPr/>
-        <p:nvPr/>
-      </p:nvGrpSpPr>
-      <p:grpSpPr>
-        <a:xfrm>
-          <a:off x="0" y="0"/>
-          <a:ext cx="0" cy="0"/>
-          <a:chOff x="0" y="0"/>
-          <a:chExt cx="0" cy="0"/>
-        </a:xfrm>
-      </p:grpSpPr>
-      <p:sp>
-        <p:nvSpPr>
-          <p:cNvPr id="2" name="Title 1"/>
-          <p:cNvSpPr>
-            <a:spLocks noGrp="1"/>
-          </p:cNvSpPr>
-          <p:nvPr>
-            <p:ph type="title"/>
-          </p:nvPr>
-        </p:nvSpPr>
-        <p:spPr/>
-        <p:txBody>
-          <a:bodyPr/>
-          <a:lstStyle/>
-          <a:p>
-            <a:r>
-              <a:rPr lang="en-US" dirty="0" smtClean="0"/>
-              <a:t>Salient features (continued)</a:t>
-            </a:r>
-            <a:endParaRPr lang="en-US" dirty="0"/>
-          </a:p>
-        </p:txBody>
-      </p:sp>
-      <p:sp>
-        <p:nvSpPr>
-          <p:cNvPr id="3" name="Content Placeholder 2"/>
-          <p:cNvSpPr>
-            <a:spLocks noGrp="1"/>
-          </p:cNvSpPr>
-          <p:nvPr>
-            <p:ph idx="1"/>
-          </p:nvPr>
-        </p:nvSpPr>
-        <p:spPr/>
-        <p:txBody>
-          <a:bodyPr>
-            <a:normAutofit fontScale="70000" lnSpcReduction="20000"/>
-          </a:bodyPr>
-          <a:lstStyle/>
-          <a:p>
-            <a:r>
-              <a:rPr lang="en-US" dirty="0" smtClean="0"/>
-              <a:t>Risk and </a:t>
-            </a:r>
-            <a:r>
-              <a:rPr lang="en-US" dirty="0" err="1" smtClean="0"/>
-              <a:t>RiskFields</a:t>
-            </a:r>
-            <a:r>
-              <a:rPr lang="en-US" dirty="0" smtClean="0"/>
-              <a:t> carry extra metadata related to </a:t>
-            </a:r>
-            <a:r>
-              <a:rPr lang="en-US" dirty="0" err="1" smtClean="0"/>
-              <a:t>RiskType</a:t>
-            </a:r>
-            <a:r>
-              <a:rPr lang="en-US" dirty="0" smtClean="0"/>
-              <a:t> and </a:t>
-            </a:r>
-            <a:r>
-              <a:rPr lang="en-US" dirty="0" err="1" smtClean="0"/>
-              <a:t>RiskTypeFields</a:t>
-            </a:r>
-            <a:r>
-              <a:rPr lang="en-US" dirty="0" smtClean="0"/>
-              <a:t>.</a:t>
-            </a:r>
-          </a:p>
-          <a:p>
-            <a:endParaRPr lang="en-US" dirty="0" smtClean="0"/>
-          </a:p>
-          <a:p>
-            <a:r>
-              <a:rPr lang="en-US" dirty="0" smtClean="0"/>
-              <a:t>On authentication front, only authenticated users can access </a:t>
-            </a:r>
-            <a:r>
-              <a:rPr lang="en-US" dirty="0" err="1" smtClean="0"/>
-              <a:t>RiskAPI</a:t>
-            </a:r>
-            <a:r>
-              <a:rPr lang="en-US" dirty="0" smtClean="0"/>
-              <a:t>. Role based authorization further enable only admin users to create/delete </a:t>
-            </a:r>
-            <a:r>
-              <a:rPr lang="en-US" dirty="0" err="1" smtClean="0"/>
-              <a:t>RiskType</a:t>
-            </a:r>
-            <a:r>
-              <a:rPr lang="en-US" dirty="0" smtClean="0"/>
-              <a:t>. Non admin users only have list and details option for </a:t>
-            </a:r>
-            <a:r>
-              <a:rPr lang="en-US" dirty="0" err="1" smtClean="0"/>
-              <a:t>RiskTypes</a:t>
-            </a:r>
-            <a:r>
-              <a:rPr lang="en-US" dirty="0" smtClean="0"/>
-              <a:t>. However they can create Risk instances based on </a:t>
-            </a:r>
-            <a:r>
-              <a:rPr lang="en-US" dirty="0" err="1" smtClean="0"/>
-              <a:t>RiskTypes</a:t>
-            </a:r>
-            <a:r>
-              <a:rPr lang="en-US" dirty="0" smtClean="0"/>
-              <a:t>.</a:t>
-            </a:r>
-          </a:p>
-          <a:p>
-            <a:endParaRPr lang="en-US" dirty="0" smtClean="0"/>
-          </a:p>
-          <a:p>
-            <a:r>
-              <a:rPr lang="en-US" dirty="0" smtClean="0"/>
-              <a:t>Session authentication is used for browsable API that runs within same session that of Web API</a:t>
-            </a:r>
-          </a:p>
-          <a:p>
-            <a:endParaRPr lang="en-US" dirty="0" smtClean="0"/>
-          </a:p>
-          <a:p>
-            <a:r>
-              <a:rPr lang="en-US" dirty="0" smtClean="0"/>
-              <a:t>Token authentication is used for </a:t>
-            </a:r>
-            <a:r>
-              <a:rPr lang="en-US" dirty="0" err="1" smtClean="0"/>
-              <a:t>seperate</a:t>
-            </a:r>
-            <a:r>
-              <a:rPr lang="en-US" dirty="0" smtClean="0"/>
-              <a:t> website that access Web API for retrieving and creating </a:t>
-            </a:r>
-            <a:r>
-              <a:rPr lang="en-US" dirty="0" err="1" smtClean="0"/>
-              <a:t>RiskTypes</a:t>
-            </a:r>
-            <a:r>
-              <a:rPr lang="en-US" dirty="0" smtClean="0"/>
-              <a:t> and Risk.</a:t>
-            </a:r>
-          </a:p>
-          <a:p>
-            <a:endParaRPr lang="en-US" dirty="0"/>
-          </a:p>
-        </p:txBody>
-      </p:sp>
-    </p:spTree>
-  </p:cSld>
-  <p:clrMapOvr>
-    <a:masterClrMapping/>
-  </p:clrMapOvr>
-  <p:timing>
-    <p:tnLst>
-      <p:par>
-        <p:cTn id="1" dur="indefinite" restart="never" nodeType="tmRoot"/>
-      </p:par>
-    </p:tnLst>
-  </p:timing>
-</p:sld>
-</file>
-
-<file path=ppt/slides/slide7.xml><?xml version="1.0" encoding="utf-8"?>
-<p:sld xmlns:a="http://schemas.openxmlformats.org/drawingml/2006/main" xmlns:r="http://schemas.openxmlformats.org/officeDocument/2006/relationships" xmlns:p="http://schemas.openxmlformats.org/presentationml/2006/main">
-  <p:cSld>
-    <p:spTree>
-      <p:nvGrpSpPr>
-        <p:cNvPr id="1" name=""/>
-        <p:cNvGrpSpPr/>
-        <p:nvPr/>
-      </p:nvGrpSpPr>
-      <p:grpSpPr>
-        <a:xfrm>
-          <a:off x="0" y="0"/>
-          <a:ext cx="0" cy="0"/>
-          <a:chOff x="0" y="0"/>
-          <a:chExt cx="0" cy="0"/>
-        </a:xfrm>
-      </p:grpSpPr>
-      <p:sp>
-        <p:nvSpPr>
-          <p:cNvPr id="2" name="Title 1"/>
-          <p:cNvSpPr>
-            <a:spLocks noGrp="1"/>
-          </p:cNvSpPr>
-          <p:nvPr>
-            <p:ph type="title"/>
-          </p:nvPr>
-        </p:nvSpPr>
-        <p:spPr/>
-        <p:txBody>
-          <a:bodyPr/>
-          <a:lstStyle/>
-          <a:p>
-            <a:r>
-              <a:rPr lang="en-US" dirty="0" smtClean="0"/>
-              <a:t>Salient features (continued)</a:t>
-            </a:r>
-            <a:endParaRPr lang="en-US" dirty="0"/>
-          </a:p>
-        </p:txBody>
-      </p:sp>
-      <p:sp>
-        <p:nvSpPr>
-          <p:cNvPr id="3" name="Content Placeholder 2"/>
-          <p:cNvSpPr>
-            <a:spLocks noGrp="1"/>
-          </p:cNvSpPr>
-          <p:nvPr>
-            <p:ph idx="1"/>
-          </p:nvPr>
-        </p:nvSpPr>
-        <p:spPr/>
-        <p:txBody>
-          <a:bodyPr/>
-          <a:lstStyle/>
-          <a:p>
-            <a:pPr>
-              <a:lnSpc>
-                <a:spcPct val="80000"/>
-              </a:lnSpc>
-            </a:pPr>
-            <a:r>
-              <a:rPr lang="en-US" sz="2200" dirty="0" smtClean="0"/>
-              <a:t>Used Default router to list all available links and </a:t>
-            </a:r>
-            <a:r>
-              <a:rPr lang="en-US" sz="2200" dirty="0" err="1" smtClean="0"/>
-              <a:t>Pastebin</a:t>
-            </a:r>
-            <a:r>
-              <a:rPr lang="en-US" sz="2200" dirty="0" smtClean="0"/>
-              <a:t> docs </a:t>
-            </a:r>
-            <a:r>
-              <a:rPr lang="en-US" sz="2200" dirty="0" smtClean="0"/>
-              <a:t>and </a:t>
-            </a:r>
-            <a:r>
-              <a:rPr lang="en-US" sz="2200" dirty="0" smtClean="0"/>
-              <a:t>schema information </a:t>
-            </a:r>
-            <a:r>
-              <a:rPr lang="en-US" sz="2200" dirty="0" smtClean="0"/>
-              <a:t>also available for API.</a:t>
-            </a:r>
-            <a:endParaRPr lang="en-US" sz="2200" dirty="0" smtClean="0"/>
-          </a:p>
-          <a:p>
-            <a:pPr>
-              <a:lnSpc>
-                <a:spcPct val="80000"/>
-              </a:lnSpc>
-            </a:pPr>
-            <a:endParaRPr lang="en-US" sz="2200" dirty="0" smtClean="0"/>
-          </a:p>
-          <a:p>
-            <a:pPr>
-              <a:lnSpc>
-                <a:spcPct val="80000"/>
-              </a:lnSpc>
-            </a:pPr>
-            <a:r>
-              <a:rPr lang="en-US" sz="2200" dirty="0" smtClean="0"/>
-              <a:t>One touch </a:t>
-            </a:r>
-            <a:r>
-              <a:rPr lang="en-US" sz="2200" dirty="0" err="1" smtClean="0"/>
-              <a:t>Heroku</a:t>
-            </a:r>
-            <a:r>
-              <a:rPr lang="en-US" sz="2200" dirty="0" smtClean="0"/>
-              <a:t> deploy button.</a:t>
-            </a:r>
-          </a:p>
-          <a:p>
-            <a:endParaRPr lang="en-US" dirty="0"/>
-          </a:p>
-        </p:txBody>
-      </p:sp>
-    </p:spTree>
-  </p:cSld>
-  <p:clrMapOvr>
-    <a:masterClrMapping/>
-  </p:clrMapOvr>
-  <p:timing>
-    <p:tnLst>
-      <p:par>
-        <p:cTn id="1" dur="indefinite" restart="never" nodeType="tmRoot"/>
-      </p:par>
-    </p:tnLst>
-  </p:timing>
-</p:sld>
-</file>
-
-<file path=ppt/slides/slide8.xml><?xml version="1.0" encoding="utf-8"?>
 <p:sld xmlns:a="http://schemas.openxmlformats.org/drawingml/2006/main" xmlns:r="http://schemas.openxmlformats.org/officeDocument/2006/relationships" xmlns:p="http://schemas.openxmlformats.org/presentationml/2006/main">
   <p:cSld>
     <p:spTree>
@@ -5056,7 +3495,7 @@
 </p:sld>
 </file>
 
-<file path=ppt/slides/slide9.xml><?xml version="1.0" encoding="utf-8"?>
+<file path=ppt/slides/slide12.xml><?xml version="1.0" encoding="utf-8"?>
 <p:sld xmlns:a="http://schemas.openxmlformats.org/drawingml/2006/main" xmlns:r="http://schemas.openxmlformats.org/officeDocument/2006/relationships" xmlns:p="http://schemas.openxmlformats.org/presentationml/2006/main">
   <p:cSld>
     <p:spTree>
@@ -5129,6 +3568,1771 @@
           <a:effectLst/>
         </p:spPr>
       </p:pic>
+    </p:spTree>
+  </p:cSld>
+  <p:clrMapOvr>
+    <a:masterClrMapping/>
+  </p:clrMapOvr>
+  <p:timing>
+    <p:tnLst>
+      <p:par>
+        <p:cTn id="1" dur="indefinite" restart="never" nodeType="tmRoot"/>
+      </p:par>
+    </p:tnLst>
+  </p:timing>
+</p:sld>
+</file>
+
+<file path=ppt/slides/slide13.xml><?xml version="1.0" encoding="utf-8"?>
+<p:sld xmlns:a="http://schemas.openxmlformats.org/drawingml/2006/main" xmlns:r="http://schemas.openxmlformats.org/officeDocument/2006/relationships" xmlns:p="http://schemas.openxmlformats.org/presentationml/2006/main">
+  <p:cSld>
+    <p:spTree>
+      <p:nvGrpSpPr>
+        <p:cNvPr id="1" name=""/>
+        <p:cNvGrpSpPr/>
+        <p:nvPr/>
+      </p:nvGrpSpPr>
+      <p:grpSpPr>
+        <a:xfrm>
+          <a:off x="0" y="0"/>
+          <a:ext cx="0" cy="0"/>
+          <a:chOff x="0" y="0"/>
+          <a:chExt cx="0" cy="0"/>
+        </a:xfrm>
+      </p:grpSpPr>
+      <p:sp>
+        <p:nvSpPr>
+          <p:cNvPr id="2" name="Title 1"/>
+          <p:cNvSpPr>
+            <a:spLocks noGrp="1"/>
+          </p:cNvSpPr>
+          <p:nvPr>
+            <p:ph type="title"/>
+          </p:nvPr>
+        </p:nvSpPr>
+        <p:spPr/>
+        <p:txBody>
+          <a:bodyPr/>
+          <a:lstStyle/>
+          <a:p>
+            <a:r>
+              <a:rPr lang="en-US" dirty="0" smtClean="0"/>
+              <a:t>Enter credentials</a:t>
+            </a:r>
+            <a:endParaRPr lang="en-US" dirty="0"/>
+          </a:p>
+        </p:txBody>
+      </p:sp>
+      <p:pic>
+        <p:nvPicPr>
+          <p:cNvPr id="2052" name="Picture 4"/>
+          <p:cNvPicPr>
+            <a:picLocks noChangeAspect="1" noChangeArrowheads="1"/>
+          </p:cNvPicPr>
+          <p:nvPr/>
+        </p:nvPicPr>
+        <p:blipFill>
+          <a:blip r:embed="rId2"/>
+          <a:srcRect/>
+          <a:stretch>
+            <a:fillRect/>
+          </a:stretch>
+        </p:blipFill>
+        <p:spPr bwMode="auto">
+          <a:xfrm>
+            <a:off x="234950" y="1295400"/>
+            <a:ext cx="8674100" cy="4572000"/>
+          </a:xfrm>
+          <a:prstGeom prst="rect">
+            <a:avLst/>
+          </a:prstGeom>
+          <a:noFill/>
+          <a:ln w="9525">
+            <a:noFill/>
+            <a:miter lim="800000"/>
+            <a:headEnd/>
+            <a:tailEnd/>
+          </a:ln>
+          <a:effectLst/>
+        </p:spPr>
+      </p:pic>
+    </p:spTree>
+  </p:cSld>
+  <p:clrMapOvr>
+    <a:masterClrMapping/>
+  </p:clrMapOvr>
+  <p:timing>
+    <p:tnLst>
+      <p:par>
+        <p:cTn id="1" dur="indefinite" restart="never" nodeType="tmRoot"/>
+      </p:par>
+    </p:tnLst>
+  </p:timing>
+</p:sld>
+</file>
+
+<file path=ppt/slides/slide14.xml><?xml version="1.0" encoding="utf-8"?>
+<p:sld xmlns:a="http://schemas.openxmlformats.org/drawingml/2006/main" xmlns:r="http://schemas.openxmlformats.org/officeDocument/2006/relationships" xmlns:p="http://schemas.openxmlformats.org/presentationml/2006/main">
+  <p:cSld>
+    <p:spTree>
+      <p:nvGrpSpPr>
+        <p:cNvPr id="1" name=""/>
+        <p:cNvGrpSpPr/>
+        <p:nvPr/>
+      </p:nvGrpSpPr>
+      <p:grpSpPr>
+        <a:xfrm>
+          <a:off x="0" y="0"/>
+          <a:ext cx="0" cy="0"/>
+          <a:chOff x="0" y="0"/>
+          <a:chExt cx="0" cy="0"/>
+        </a:xfrm>
+      </p:grpSpPr>
+      <p:sp>
+        <p:nvSpPr>
+          <p:cNvPr id="2" name="Title 1"/>
+          <p:cNvSpPr>
+            <a:spLocks noGrp="1"/>
+          </p:cNvSpPr>
+          <p:nvPr>
+            <p:ph type="title"/>
+          </p:nvPr>
+        </p:nvSpPr>
+        <p:spPr/>
+        <p:txBody>
+          <a:bodyPr/>
+          <a:lstStyle/>
+          <a:p>
+            <a:r>
+              <a:rPr lang="en-US" dirty="0" smtClean="0"/>
+              <a:t>Successful Login</a:t>
+            </a:r>
+            <a:endParaRPr lang="en-US" dirty="0"/>
+          </a:p>
+        </p:txBody>
+      </p:sp>
+      <p:pic>
+        <p:nvPicPr>
+          <p:cNvPr id="3" name="Picture 2"/>
+          <p:cNvPicPr>
+            <a:picLocks noChangeAspect="1" noChangeArrowheads="1"/>
+          </p:cNvPicPr>
+          <p:nvPr/>
+        </p:nvPicPr>
+        <p:blipFill>
+          <a:blip r:embed="rId2"/>
+          <a:srcRect/>
+          <a:stretch>
+            <a:fillRect/>
+          </a:stretch>
+        </p:blipFill>
+        <p:spPr bwMode="auto">
+          <a:xfrm>
+            <a:off x="234950" y="1371600"/>
+            <a:ext cx="8674100" cy="4572000"/>
+          </a:xfrm>
+          <a:prstGeom prst="rect">
+            <a:avLst/>
+          </a:prstGeom>
+          <a:noFill/>
+          <a:ln w="9525">
+            <a:noFill/>
+            <a:miter lim="800000"/>
+            <a:headEnd/>
+            <a:tailEnd/>
+          </a:ln>
+          <a:effectLst/>
+        </p:spPr>
+      </p:pic>
+    </p:spTree>
+  </p:cSld>
+  <p:clrMapOvr>
+    <a:masterClrMapping/>
+  </p:clrMapOvr>
+  <p:timing>
+    <p:tnLst>
+      <p:par>
+        <p:cTn id="1" dur="indefinite" restart="never" nodeType="tmRoot"/>
+      </p:par>
+    </p:tnLst>
+  </p:timing>
+</p:sld>
+</file>
+
+<file path=ppt/slides/slide15.xml><?xml version="1.0" encoding="utf-8"?>
+<p:sld xmlns:a="http://schemas.openxmlformats.org/drawingml/2006/main" xmlns:r="http://schemas.openxmlformats.org/officeDocument/2006/relationships" xmlns:p="http://schemas.openxmlformats.org/presentationml/2006/main">
+  <p:cSld>
+    <p:spTree>
+      <p:nvGrpSpPr>
+        <p:cNvPr id="1" name=""/>
+        <p:cNvGrpSpPr/>
+        <p:nvPr/>
+      </p:nvGrpSpPr>
+      <p:grpSpPr>
+        <a:xfrm>
+          <a:off x="0" y="0"/>
+          <a:ext cx="0" cy="0"/>
+          <a:chOff x="0" y="0"/>
+          <a:chExt cx="0" cy="0"/>
+        </a:xfrm>
+      </p:grpSpPr>
+      <p:sp>
+        <p:nvSpPr>
+          <p:cNvPr id="2" name="Title 1"/>
+          <p:cNvSpPr>
+            <a:spLocks noGrp="1"/>
+          </p:cNvSpPr>
+          <p:nvPr>
+            <p:ph type="title"/>
+          </p:nvPr>
+        </p:nvSpPr>
+        <p:spPr/>
+        <p:txBody>
+          <a:bodyPr/>
+          <a:lstStyle/>
+          <a:p>
+            <a:r>
+              <a:rPr lang="en-US" dirty="0" smtClean="0"/>
+              <a:t>API Root shows Default Router</a:t>
+            </a:r>
+            <a:endParaRPr lang="en-US" dirty="0"/>
+          </a:p>
+        </p:txBody>
+      </p:sp>
+      <p:pic>
+        <p:nvPicPr>
+          <p:cNvPr id="5122" name="Picture 2"/>
+          <p:cNvPicPr>
+            <a:picLocks noChangeAspect="1" noChangeArrowheads="1"/>
+          </p:cNvPicPr>
+          <p:nvPr/>
+        </p:nvPicPr>
+        <p:blipFill>
+          <a:blip r:embed="rId2"/>
+          <a:srcRect/>
+          <a:stretch>
+            <a:fillRect/>
+          </a:stretch>
+        </p:blipFill>
+        <p:spPr bwMode="auto">
+          <a:xfrm>
+            <a:off x="234950" y="1371600"/>
+            <a:ext cx="8674100" cy="4572000"/>
+          </a:xfrm>
+          <a:prstGeom prst="rect">
+            <a:avLst/>
+          </a:prstGeom>
+          <a:noFill/>
+          <a:ln w="9525">
+            <a:noFill/>
+            <a:miter lim="800000"/>
+            <a:headEnd/>
+            <a:tailEnd/>
+          </a:ln>
+          <a:effectLst/>
+        </p:spPr>
+      </p:pic>
+    </p:spTree>
+  </p:cSld>
+  <p:clrMapOvr>
+    <a:masterClrMapping/>
+  </p:clrMapOvr>
+  <p:timing>
+    <p:tnLst>
+      <p:par>
+        <p:cTn id="1" dur="indefinite" restart="never" nodeType="tmRoot"/>
+      </p:par>
+    </p:tnLst>
+  </p:timing>
+</p:sld>
+</file>
+
+<file path=ppt/slides/slide16.xml><?xml version="1.0" encoding="utf-8"?>
+<p:sld xmlns:a="http://schemas.openxmlformats.org/drawingml/2006/main" xmlns:r="http://schemas.openxmlformats.org/officeDocument/2006/relationships" xmlns:p="http://schemas.openxmlformats.org/presentationml/2006/main">
+  <p:cSld>
+    <p:spTree>
+      <p:nvGrpSpPr>
+        <p:cNvPr id="1" name=""/>
+        <p:cNvGrpSpPr/>
+        <p:nvPr/>
+      </p:nvGrpSpPr>
+      <p:grpSpPr>
+        <a:xfrm>
+          <a:off x="0" y="0"/>
+          <a:ext cx="0" cy="0"/>
+          <a:chOff x="0" y="0"/>
+          <a:chExt cx="0" cy="0"/>
+        </a:xfrm>
+      </p:grpSpPr>
+      <p:sp>
+        <p:nvSpPr>
+          <p:cNvPr id="2" name="Title 1"/>
+          <p:cNvSpPr>
+            <a:spLocks noGrp="1"/>
+          </p:cNvSpPr>
+          <p:nvPr>
+            <p:ph type="title"/>
+          </p:nvPr>
+        </p:nvSpPr>
+        <p:spPr/>
+        <p:txBody>
+          <a:bodyPr/>
+          <a:lstStyle/>
+          <a:p>
+            <a:r>
+              <a:rPr lang="en-US" dirty="0" smtClean="0"/>
+              <a:t>Posting </a:t>
+            </a:r>
+            <a:r>
+              <a:rPr lang="en-US" dirty="0" err="1" smtClean="0"/>
+              <a:t>RiskType</a:t>
+            </a:r>
+            <a:r>
+              <a:rPr lang="en-US" dirty="0" smtClean="0"/>
+              <a:t> successfully</a:t>
+            </a:r>
+            <a:endParaRPr lang="en-US" dirty="0"/>
+          </a:p>
+        </p:txBody>
+      </p:sp>
+      <p:pic>
+        <p:nvPicPr>
+          <p:cNvPr id="6146" name="Picture 2"/>
+          <p:cNvPicPr>
+            <a:picLocks noChangeAspect="1" noChangeArrowheads="1"/>
+          </p:cNvPicPr>
+          <p:nvPr/>
+        </p:nvPicPr>
+        <p:blipFill>
+          <a:blip r:embed="rId2"/>
+          <a:srcRect/>
+          <a:stretch>
+            <a:fillRect/>
+          </a:stretch>
+        </p:blipFill>
+        <p:spPr bwMode="auto">
+          <a:xfrm>
+            <a:off x="234950" y="1600200"/>
+            <a:ext cx="8674100" cy="4572000"/>
+          </a:xfrm>
+          <a:prstGeom prst="rect">
+            <a:avLst/>
+          </a:prstGeom>
+          <a:noFill/>
+          <a:ln w="9525">
+            <a:noFill/>
+            <a:miter lim="800000"/>
+            <a:headEnd/>
+            <a:tailEnd/>
+          </a:ln>
+          <a:effectLst/>
+        </p:spPr>
+      </p:pic>
+    </p:spTree>
+  </p:cSld>
+  <p:clrMapOvr>
+    <a:masterClrMapping/>
+  </p:clrMapOvr>
+  <p:timing>
+    <p:tnLst>
+      <p:par>
+        <p:cTn id="1" dur="indefinite" restart="never" nodeType="tmRoot"/>
+      </p:par>
+    </p:tnLst>
+  </p:timing>
+</p:sld>
+</file>
+
+<file path=ppt/slides/slide17.xml><?xml version="1.0" encoding="utf-8"?>
+<p:sld xmlns:a="http://schemas.openxmlformats.org/drawingml/2006/main" xmlns:r="http://schemas.openxmlformats.org/officeDocument/2006/relationships" xmlns:p="http://schemas.openxmlformats.org/presentationml/2006/main">
+  <p:cSld>
+    <p:spTree>
+      <p:nvGrpSpPr>
+        <p:cNvPr id="1" name=""/>
+        <p:cNvGrpSpPr/>
+        <p:nvPr/>
+      </p:nvGrpSpPr>
+      <p:grpSpPr>
+        <a:xfrm>
+          <a:off x="0" y="0"/>
+          <a:ext cx="0" cy="0"/>
+          <a:chOff x="0" y="0"/>
+          <a:chExt cx="0" cy="0"/>
+        </a:xfrm>
+      </p:grpSpPr>
+      <p:sp>
+        <p:nvSpPr>
+          <p:cNvPr id="2" name="Title 1"/>
+          <p:cNvSpPr>
+            <a:spLocks noGrp="1"/>
+          </p:cNvSpPr>
+          <p:nvPr>
+            <p:ph type="title"/>
+          </p:nvPr>
+        </p:nvSpPr>
+        <p:spPr/>
+        <p:txBody>
+          <a:bodyPr/>
+          <a:lstStyle/>
+          <a:p>
+            <a:r>
+              <a:rPr lang="en-US" dirty="0" smtClean="0"/>
+              <a:t>Posting Risk Instance</a:t>
+            </a:r>
+            <a:endParaRPr lang="en-US" dirty="0"/>
+          </a:p>
+        </p:txBody>
+      </p:sp>
+      <p:pic>
+        <p:nvPicPr>
+          <p:cNvPr id="7170" name="Picture 2"/>
+          <p:cNvPicPr>
+            <a:picLocks noChangeAspect="1" noChangeArrowheads="1"/>
+          </p:cNvPicPr>
+          <p:nvPr/>
+        </p:nvPicPr>
+        <p:blipFill>
+          <a:blip r:embed="rId2"/>
+          <a:srcRect/>
+          <a:stretch>
+            <a:fillRect/>
+          </a:stretch>
+        </p:blipFill>
+        <p:spPr bwMode="auto">
+          <a:xfrm>
+            <a:off x="234950" y="1295400"/>
+            <a:ext cx="8674100" cy="4572000"/>
+          </a:xfrm>
+          <a:prstGeom prst="rect">
+            <a:avLst/>
+          </a:prstGeom>
+          <a:noFill/>
+          <a:ln w="9525">
+            <a:noFill/>
+            <a:miter lim="800000"/>
+            <a:headEnd/>
+            <a:tailEnd/>
+          </a:ln>
+          <a:effectLst/>
+        </p:spPr>
+      </p:pic>
+    </p:spTree>
+  </p:cSld>
+  <p:clrMapOvr>
+    <a:masterClrMapping/>
+  </p:clrMapOvr>
+  <p:timing>
+    <p:tnLst>
+      <p:par>
+        <p:cTn id="1" dur="indefinite" restart="never" nodeType="tmRoot"/>
+      </p:par>
+    </p:tnLst>
+  </p:timing>
+</p:sld>
+</file>
+
+<file path=ppt/slides/slide18.xml><?xml version="1.0" encoding="utf-8"?>
+<p:sld xmlns:a="http://schemas.openxmlformats.org/drawingml/2006/main" xmlns:r="http://schemas.openxmlformats.org/officeDocument/2006/relationships" xmlns:p="http://schemas.openxmlformats.org/presentationml/2006/main">
+  <p:cSld>
+    <p:spTree>
+      <p:nvGrpSpPr>
+        <p:cNvPr id="1" name=""/>
+        <p:cNvGrpSpPr/>
+        <p:nvPr/>
+      </p:nvGrpSpPr>
+      <p:grpSpPr>
+        <a:xfrm>
+          <a:off x="0" y="0"/>
+          <a:ext cx="0" cy="0"/>
+          <a:chOff x="0" y="0"/>
+          <a:chExt cx="0" cy="0"/>
+        </a:xfrm>
+      </p:grpSpPr>
+      <p:sp>
+        <p:nvSpPr>
+          <p:cNvPr id="2" name="Title 1"/>
+          <p:cNvSpPr>
+            <a:spLocks noGrp="1"/>
+          </p:cNvSpPr>
+          <p:nvPr>
+            <p:ph type="title"/>
+          </p:nvPr>
+        </p:nvSpPr>
+        <p:spPr/>
+        <p:txBody>
+          <a:bodyPr/>
+          <a:lstStyle/>
+          <a:p>
+            <a:r>
+              <a:rPr lang="en-US" dirty="0" smtClean="0"/>
+              <a:t>Get </a:t>
+            </a:r>
+            <a:r>
+              <a:rPr lang="en-US" dirty="0" err="1" smtClean="0"/>
+              <a:t>RiskTypeKeys</a:t>
+            </a:r>
+            <a:endParaRPr lang="en-US" dirty="0"/>
+          </a:p>
+        </p:txBody>
+      </p:sp>
+      <p:pic>
+        <p:nvPicPr>
+          <p:cNvPr id="8194" name="Picture 2"/>
+          <p:cNvPicPr>
+            <a:picLocks noChangeAspect="1" noChangeArrowheads="1"/>
+          </p:cNvPicPr>
+          <p:nvPr/>
+        </p:nvPicPr>
+        <p:blipFill>
+          <a:blip r:embed="rId2"/>
+          <a:srcRect/>
+          <a:stretch>
+            <a:fillRect/>
+          </a:stretch>
+        </p:blipFill>
+        <p:spPr bwMode="auto">
+          <a:xfrm>
+            <a:off x="234950" y="1295400"/>
+            <a:ext cx="8674100" cy="4572000"/>
+          </a:xfrm>
+          <a:prstGeom prst="rect">
+            <a:avLst/>
+          </a:prstGeom>
+          <a:noFill/>
+          <a:ln w="9525">
+            <a:noFill/>
+            <a:miter lim="800000"/>
+            <a:headEnd/>
+            <a:tailEnd/>
+          </a:ln>
+          <a:effectLst/>
+        </p:spPr>
+      </p:pic>
+    </p:spTree>
+  </p:cSld>
+  <p:clrMapOvr>
+    <a:masterClrMapping/>
+  </p:clrMapOvr>
+  <p:timing>
+    <p:tnLst>
+      <p:par>
+        <p:cTn id="1" dur="indefinite" restart="never" nodeType="tmRoot"/>
+      </p:par>
+    </p:tnLst>
+  </p:timing>
+</p:sld>
+</file>
+
+<file path=ppt/slides/slide19.xml><?xml version="1.0" encoding="utf-8"?>
+<p:sld xmlns:a="http://schemas.openxmlformats.org/drawingml/2006/main" xmlns:r="http://schemas.openxmlformats.org/officeDocument/2006/relationships" xmlns:p="http://schemas.openxmlformats.org/presentationml/2006/main">
+  <p:cSld>
+    <p:spTree>
+      <p:nvGrpSpPr>
+        <p:cNvPr id="1" name=""/>
+        <p:cNvGrpSpPr/>
+        <p:nvPr/>
+      </p:nvGrpSpPr>
+      <p:grpSpPr>
+        <a:xfrm>
+          <a:off x="0" y="0"/>
+          <a:ext cx="0" cy="0"/>
+          <a:chOff x="0" y="0"/>
+          <a:chExt cx="0" cy="0"/>
+        </a:xfrm>
+      </p:grpSpPr>
+      <p:sp>
+        <p:nvSpPr>
+          <p:cNvPr id="2" name="Title 1"/>
+          <p:cNvSpPr>
+            <a:spLocks noGrp="1"/>
+          </p:cNvSpPr>
+          <p:nvPr>
+            <p:ph type="title"/>
+          </p:nvPr>
+        </p:nvSpPr>
+        <p:spPr/>
+        <p:txBody>
+          <a:bodyPr/>
+          <a:lstStyle/>
+          <a:p>
+            <a:r>
+              <a:rPr lang="en-US" dirty="0" smtClean="0"/>
+              <a:t>Get Risk Key List</a:t>
+            </a:r>
+            <a:endParaRPr lang="en-US" dirty="0"/>
+          </a:p>
+        </p:txBody>
+      </p:sp>
+      <p:pic>
+        <p:nvPicPr>
+          <p:cNvPr id="9218" name="Picture 2"/>
+          <p:cNvPicPr>
+            <a:picLocks noChangeAspect="1" noChangeArrowheads="1"/>
+          </p:cNvPicPr>
+          <p:nvPr/>
+        </p:nvPicPr>
+        <p:blipFill>
+          <a:blip r:embed="rId2"/>
+          <a:srcRect/>
+          <a:stretch>
+            <a:fillRect/>
+          </a:stretch>
+        </p:blipFill>
+        <p:spPr bwMode="auto">
+          <a:xfrm>
+            <a:off x="234950" y="1371600"/>
+            <a:ext cx="8674100" cy="4572000"/>
+          </a:xfrm>
+          <a:prstGeom prst="rect">
+            <a:avLst/>
+          </a:prstGeom>
+          <a:noFill/>
+          <a:ln w="9525">
+            <a:noFill/>
+            <a:miter lim="800000"/>
+            <a:headEnd/>
+            <a:tailEnd/>
+          </a:ln>
+          <a:effectLst/>
+        </p:spPr>
+      </p:pic>
+    </p:spTree>
+  </p:cSld>
+  <p:clrMapOvr>
+    <a:masterClrMapping/>
+  </p:clrMapOvr>
+  <p:timing>
+    <p:tnLst>
+      <p:par>
+        <p:cTn id="1" dur="indefinite" restart="never" nodeType="tmRoot"/>
+      </p:par>
+    </p:tnLst>
+  </p:timing>
+</p:sld>
+</file>
+
+<file path=ppt/slides/slide2.xml><?xml version="1.0" encoding="utf-8"?>
+<p:sld xmlns:a="http://schemas.openxmlformats.org/drawingml/2006/main" xmlns:r="http://schemas.openxmlformats.org/officeDocument/2006/relationships" xmlns:p="http://schemas.openxmlformats.org/presentationml/2006/main">
+  <p:cSld>
+    <p:spTree>
+      <p:nvGrpSpPr>
+        <p:cNvPr id="1" name=""/>
+        <p:cNvGrpSpPr/>
+        <p:nvPr/>
+      </p:nvGrpSpPr>
+      <p:grpSpPr>
+        <a:xfrm>
+          <a:off x="0" y="0"/>
+          <a:ext cx="0" cy="0"/>
+          <a:chOff x="0" y="0"/>
+          <a:chExt cx="0" cy="0"/>
+        </a:xfrm>
+      </p:grpSpPr>
+      <p:sp>
+        <p:nvSpPr>
+          <p:cNvPr id="2" name="Title 1"/>
+          <p:cNvSpPr>
+            <a:spLocks noGrp="1"/>
+          </p:cNvSpPr>
+          <p:nvPr>
+            <p:ph type="title"/>
+          </p:nvPr>
+        </p:nvSpPr>
+        <p:spPr/>
+        <p:txBody>
+          <a:bodyPr/>
+          <a:lstStyle/>
+          <a:p>
+            <a:r>
+              <a:rPr lang="en-US" dirty="0" smtClean="0"/>
+              <a:t>AWS Lambda deployment	</a:t>
+            </a:r>
+            <a:endParaRPr lang="en-US" dirty="0"/>
+          </a:p>
+        </p:txBody>
+      </p:sp>
+      <p:sp>
+        <p:nvSpPr>
+          <p:cNvPr id="3" name="Content Placeholder 2"/>
+          <p:cNvSpPr>
+            <a:spLocks noGrp="1"/>
+          </p:cNvSpPr>
+          <p:nvPr>
+            <p:ph idx="1"/>
+          </p:nvPr>
+        </p:nvSpPr>
+        <p:spPr/>
+        <p:txBody>
+          <a:bodyPr>
+            <a:normAutofit fontScale="85000" lnSpcReduction="20000"/>
+          </a:bodyPr>
+          <a:lstStyle/>
+          <a:p>
+            <a:r>
+              <a:rPr lang="en-US" dirty="0" smtClean="0"/>
+              <a:t>Created AWS RDS instance and Subnets via AWS console</a:t>
+            </a:r>
+          </a:p>
+          <a:p>
+            <a:r>
+              <a:rPr lang="en-US" dirty="0" smtClean="0"/>
+              <a:t>AWS </a:t>
+            </a:r>
+            <a:r>
+              <a:rPr lang="en-US" smtClean="0"/>
+              <a:t>lambda deployment using Zappa </a:t>
+            </a:r>
+            <a:r>
+              <a:rPr lang="en-US" dirty="0" smtClean="0"/>
+              <a:t>as per instruction in </a:t>
+            </a:r>
+            <a:r>
+              <a:rPr lang="en-US" dirty="0" err="1" smtClean="0"/>
+              <a:t>GitHub</a:t>
+            </a:r>
+            <a:r>
+              <a:rPr lang="en-US" dirty="0" smtClean="0"/>
+              <a:t> repo.</a:t>
+            </a:r>
+          </a:p>
+          <a:p>
+            <a:r>
+              <a:rPr lang="en-US" dirty="0" smtClean="0">
+                <a:hlinkClick r:id="rId2"/>
+              </a:rPr>
+              <a:t>https://2pprl7yzie.execute-api.ap-southeast-1.amazonaws.com/dev</a:t>
+            </a:r>
+            <a:endParaRPr lang="en-US" dirty="0" smtClean="0"/>
+          </a:p>
+          <a:p>
+            <a:r>
+              <a:rPr lang="en-US" dirty="0" smtClean="0"/>
+              <a:t>Same credentials are used as mentioned in previous slide.</a:t>
+            </a:r>
+          </a:p>
+          <a:p>
+            <a:r>
+              <a:rPr lang="en-US" dirty="0" smtClean="0"/>
+              <a:t>Caution as I have used Token based authentication in order to access API via UI. AWS deployment can not be easily tested via URL in plain browser as we need to piggy back token with each request after login.</a:t>
+            </a:r>
+          </a:p>
+          <a:p>
+            <a:endParaRPr lang="en-US" dirty="0" smtClean="0"/>
+          </a:p>
+          <a:p>
+            <a:pPr>
+              <a:buNone/>
+            </a:pPr>
+            <a:endParaRPr lang="en-US" dirty="0" smtClean="0"/>
+          </a:p>
+          <a:p>
+            <a:pPr>
+              <a:buNone/>
+            </a:pPr>
+            <a:endParaRPr lang="en-US" dirty="0"/>
+          </a:p>
+        </p:txBody>
+      </p:sp>
+    </p:spTree>
+  </p:cSld>
+  <p:clrMapOvr>
+    <a:masterClrMapping/>
+  </p:clrMapOvr>
+  <p:timing>
+    <p:tnLst>
+      <p:par>
+        <p:cTn id="1" dur="indefinite" restart="never" nodeType="tmRoot"/>
+      </p:par>
+    </p:tnLst>
+  </p:timing>
+</p:sld>
+</file>
+
+<file path=ppt/slides/slide20.xml><?xml version="1.0" encoding="utf-8"?>
+<p:sld xmlns:a="http://schemas.openxmlformats.org/drawingml/2006/main" xmlns:r="http://schemas.openxmlformats.org/officeDocument/2006/relationships" xmlns:p="http://schemas.openxmlformats.org/presentationml/2006/main">
+  <p:cSld>
+    <p:spTree>
+      <p:nvGrpSpPr>
+        <p:cNvPr id="1" name=""/>
+        <p:cNvGrpSpPr/>
+        <p:nvPr/>
+      </p:nvGrpSpPr>
+      <p:grpSpPr>
+        <a:xfrm>
+          <a:off x="0" y="0"/>
+          <a:ext cx="0" cy="0"/>
+          <a:chOff x="0" y="0"/>
+          <a:chExt cx="0" cy="0"/>
+        </a:xfrm>
+      </p:grpSpPr>
+      <p:sp>
+        <p:nvSpPr>
+          <p:cNvPr id="2" name="Title 1"/>
+          <p:cNvSpPr>
+            <a:spLocks noGrp="1"/>
+          </p:cNvSpPr>
+          <p:nvPr>
+            <p:ph type="title"/>
+          </p:nvPr>
+        </p:nvSpPr>
+        <p:spPr/>
+        <p:txBody>
+          <a:bodyPr>
+            <a:normAutofit fontScale="90000"/>
+          </a:bodyPr>
+          <a:lstStyle/>
+          <a:p>
+            <a:r>
+              <a:rPr lang="en-US" dirty="0" smtClean="0">
+                <a:hlinkClick r:id="rId2"/>
+              </a:rPr>
+              <a:t>https://britecore-poc-server-session.herokuapp.com/docs/</a:t>
+            </a:r>
+            <a:endParaRPr lang="en-US" dirty="0"/>
+          </a:p>
+        </p:txBody>
+      </p:sp>
+      <p:pic>
+        <p:nvPicPr>
+          <p:cNvPr id="5122" name="Picture 2"/>
+          <p:cNvPicPr>
+            <a:picLocks noGrp="1" noChangeAspect="1" noChangeArrowheads="1"/>
+          </p:cNvPicPr>
+          <p:nvPr>
+            <p:ph idx="1"/>
+          </p:nvPr>
+        </p:nvPicPr>
+        <p:blipFill>
+          <a:blip r:embed="rId3"/>
+          <a:srcRect/>
+          <a:stretch>
+            <a:fillRect/>
+          </a:stretch>
+        </p:blipFill>
+        <p:spPr bwMode="auto">
+          <a:xfrm>
+            <a:off x="457200" y="1694326"/>
+            <a:ext cx="8229600" cy="4337710"/>
+          </a:xfrm>
+          <a:prstGeom prst="rect">
+            <a:avLst/>
+          </a:prstGeom>
+          <a:noFill/>
+          <a:ln w="9525">
+            <a:noFill/>
+            <a:miter lim="800000"/>
+            <a:headEnd/>
+            <a:tailEnd/>
+          </a:ln>
+          <a:effectLst/>
+        </p:spPr>
+      </p:pic>
+    </p:spTree>
+  </p:cSld>
+  <p:clrMapOvr>
+    <a:masterClrMapping/>
+  </p:clrMapOvr>
+  <p:timing>
+    <p:tnLst>
+      <p:par>
+        <p:cTn id="1" dur="indefinite" restart="never" nodeType="tmRoot"/>
+      </p:par>
+    </p:tnLst>
+  </p:timing>
+</p:sld>
+</file>
+
+<file path=ppt/slides/slide21.xml><?xml version="1.0" encoding="utf-8"?>
+<p:sld xmlns:a="http://schemas.openxmlformats.org/drawingml/2006/main" xmlns:r="http://schemas.openxmlformats.org/officeDocument/2006/relationships" xmlns:p="http://schemas.openxmlformats.org/presentationml/2006/main">
+  <p:cSld>
+    <p:spTree>
+      <p:nvGrpSpPr>
+        <p:cNvPr id="1" name=""/>
+        <p:cNvGrpSpPr/>
+        <p:nvPr/>
+      </p:nvGrpSpPr>
+      <p:grpSpPr>
+        <a:xfrm>
+          <a:off x="0" y="0"/>
+          <a:ext cx="0" cy="0"/>
+          <a:chOff x="0" y="0"/>
+          <a:chExt cx="0" cy="0"/>
+        </a:xfrm>
+      </p:grpSpPr>
+      <p:sp>
+        <p:nvSpPr>
+          <p:cNvPr id="2" name="Title 1"/>
+          <p:cNvSpPr>
+            <a:spLocks noGrp="1"/>
+          </p:cNvSpPr>
+          <p:nvPr>
+            <p:ph type="title"/>
+          </p:nvPr>
+        </p:nvSpPr>
+        <p:spPr/>
+        <p:txBody>
+          <a:bodyPr>
+            <a:normAutofit fontScale="90000"/>
+          </a:bodyPr>
+          <a:lstStyle/>
+          <a:p>
+            <a:r>
+              <a:rPr lang="en-US" dirty="0" smtClean="0">
+                <a:hlinkClick r:id="rId2"/>
+              </a:rPr>
+              <a:t>https://britecore-poc-server-session.herokuapp.com/schema /</a:t>
+            </a:r>
+            <a:endParaRPr lang="en-US" dirty="0"/>
+          </a:p>
+        </p:txBody>
+      </p:sp>
+      <p:pic>
+        <p:nvPicPr>
+          <p:cNvPr id="2050" name="Picture 2"/>
+          <p:cNvPicPr>
+            <a:picLocks noChangeAspect="1" noChangeArrowheads="1"/>
+          </p:cNvPicPr>
+          <p:nvPr/>
+        </p:nvPicPr>
+        <p:blipFill>
+          <a:blip r:embed="rId3"/>
+          <a:srcRect/>
+          <a:stretch>
+            <a:fillRect/>
+          </a:stretch>
+        </p:blipFill>
+        <p:spPr bwMode="auto">
+          <a:xfrm>
+            <a:off x="234950" y="1752600"/>
+            <a:ext cx="8674100" cy="4572000"/>
+          </a:xfrm>
+          <a:prstGeom prst="rect">
+            <a:avLst/>
+          </a:prstGeom>
+          <a:noFill/>
+          <a:ln w="9525">
+            <a:noFill/>
+            <a:miter lim="800000"/>
+            <a:headEnd/>
+            <a:tailEnd/>
+          </a:ln>
+          <a:effectLst/>
+        </p:spPr>
+      </p:pic>
+    </p:spTree>
+  </p:cSld>
+  <p:clrMapOvr>
+    <a:masterClrMapping/>
+  </p:clrMapOvr>
+  <p:timing>
+    <p:tnLst>
+      <p:par>
+        <p:cTn id="1" dur="indefinite" restart="never" nodeType="tmRoot"/>
+      </p:par>
+    </p:tnLst>
+  </p:timing>
+</p:sld>
+</file>
+
+<file path=ppt/slides/slide3.xml><?xml version="1.0" encoding="utf-8"?>
+<p:sld xmlns:a="http://schemas.openxmlformats.org/drawingml/2006/main" xmlns:r="http://schemas.openxmlformats.org/officeDocument/2006/relationships" xmlns:p="http://schemas.openxmlformats.org/presentationml/2006/main">
+  <p:cSld>
+    <p:spTree>
+      <p:nvGrpSpPr>
+        <p:cNvPr id="1" name=""/>
+        <p:cNvGrpSpPr/>
+        <p:nvPr/>
+      </p:nvGrpSpPr>
+      <p:grpSpPr>
+        <a:xfrm>
+          <a:off x="0" y="0"/>
+          <a:ext cx="0" cy="0"/>
+          <a:chOff x="0" y="0"/>
+          <a:chExt cx="0" cy="0"/>
+        </a:xfrm>
+      </p:grpSpPr>
+      <p:sp>
+        <p:nvSpPr>
+          <p:cNvPr id="2" name="Title 1"/>
+          <p:cNvSpPr>
+            <a:spLocks noGrp="1"/>
+          </p:cNvSpPr>
+          <p:nvPr>
+            <p:ph type="title"/>
+          </p:nvPr>
+        </p:nvSpPr>
+        <p:spPr/>
+        <p:txBody>
+          <a:bodyPr/>
+          <a:lstStyle/>
+          <a:p>
+            <a:r>
+              <a:rPr lang="en-US" dirty="0" smtClean="0"/>
+              <a:t>Source code</a:t>
+            </a:r>
+            <a:endParaRPr lang="en-US" dirty="0"/>
+          </a:p>
+        </p:txBody>
+      </p:sp>
+      <p:sp>
+        <p:nvSpPr>
+          <p:cNvPr id="3" name="Content Placeholder 2"/>
+          <p:cNvSpPr>
+            <a:spLocks noGrp="1"/>
+          </p:cNvSpPr>
+          <p:nvPr>
+            <p:ph idx="1"/>
+          </p:nvPr>
+        </p:nvSpPr>
+        <p:spPr/>
+        <p:txBody>
+          <a:bodyPr/>
+          <a:lstStyle/>
+          <a:p>
+            <a:r>
+              <a:rPr lang="en-US" dirty="0" smtClean="0">
+                <a:hlinkClick r:id="rId2"/>
+              </a:rPr>
+              <a:t>https://github.com/MaheshBodas/britecore-poc-api-master</a:t>
+            </a:r>
+            <a:endParaRPr lang="en-US" dirty="0"/>
+          </a:p>
+        </p:txBody>
+      </p:sp>
+    </p:spTree>
+  </p:cSld>
+  <p:clrMapOvr>
+    <a:masterClrMapping/>
+  </p:clrMapOvr>
+  <p:timing>
+    <p:tnLst>
+      <p:par>
+        <p:cTn id="1" dur="indefinite" restart="never" nodeType="tmRoot"/>
+      </p:par>
+    </p:tnLst>
+  </p:timing>
+</p:sld>
+</file>
+
+<file path=ppt/slides/slide4.xml><?xml version="1.0" encoding="utf-8"?>
+<p:sld xmlns:a="http://schemas.openxmlformats.org/drawingml/2006/main" xmlns:r="http://schemas.openxmlformats.org/officeDocument/2006/relationships" xmlns:p="http://schemas.openxmlformats.org/presentationml/2006/main">
+  <p:cSld>
+    <p:spTree>
+      <p:nvGrpSpPr>
+        <p:cNvPr id="1" name=""/>
+        <p:cNvGrpSpPr/>
+        <p:nvPr/>
+      </p:nvGrpSpPr>
+      <p:grpSpPr>
+        <a:xfrm>
+          <a:off x="0" y="0"/>
+          <a:ext cx="0" cy="0"/>
+          <a:chOff x="0" y="0"/>
+          <a:chExt cx="0" cy="0"/>
+        </a:xfrm>
+      </p:grpSpPr>
+      <p:sp>
+        <p:nvSpPr>
+          <p:cNvPr id="2" name="Title 1"/>
+          <p:cNvSpPr>
+            <a:spLocks noGrp="1"/>
+          </p:cNvSpPr>
+          <p:nvPr>
+            <p:ph type="title"/>
+          </p:nvPr>
+        </p:nvSpPr>
+        <p:spPr/>
+        <p:txBody>
+          <a:bodyPr/>
+          <a:lstStyle/>
+          <a:p>
+            <a:r>
+              <a:rPr lang="en-US" dirty="0" smtClean="0"/>
+              <a:t>Unit testing.</a:t>
+            </a:r>
+            <a:endParaRPr lang="en-US" dirty="0"/>
+          </a:p>
+        </p:txBody>
+      </p:sp>
+      <p:sp>
+        <p:nvSpPr>
+          <p:cNvPr id="3" name="Content Placeholder 2"/>
+          <p:cNvSpPr>
+            <a:spLocks noGrp="1"/>
+          </p:cNvSpPr>
+          <p:nvPr>
+            <p:ph idx="1"/>
+          </p:nvPr>
+        </p:nvSpPr>
+        <p:spPr/>
+        <p:txBody>
+          <a:bodyPr/>
+          <a:lstStyle/>
+          <a:p>
+            <a:r>
+              <a:rPr lang="en-US" dirty="0" smtClean="0"/>
+              <a:t>Added test cases related for Post and Get action for </a:t>
+            </a:r>
+            <a:r>
+              <a:rPr lang="en-US" dirty="0" err="1" smtClean="0"/>
+              <a:t>RiskType</a:t>
+            </a:r>
+            <a:r>
+              <a:rPr lang="en-US" dirty="0" smtClean="0"/>
+              <a:t> and Risks.</a:t>
+            </a:r>
+          </a:p>
+          <a:p>
+            <a:r>
+              <a:rPr lang="en-US" dirty="0" smtClean="0"/>
+              <a:t>Tested response for Admin and Non-admin users as API support role base authorization.</a:t>
+            </a:r>
+          </a:p>
+          <a:p>
+            <a:r>
+              <a:rPr lang="en-US" dirty="0" smtClean="0"/>
+              <a:t>Made use of Design patterns to avoid duplication of code while writing test cases.</a:t>
+            </a:r>
+            <a:endParaRPr lang="en-US" dirty="0"/>
+          </a:p>
+        </p:txBody>
+      </p:sp>
+    </p:spTree>
+  </p:cSld>
+  <p:clrMapOvr>
+    <a:masterClrMapping/>
+  </p:clrMapOvr>
+  <p:timing>
+    <p:tnLst>
+      <p:par>
+        <p:cTn id="1" dur="indefinite" restart="never" nodeType="tmRoot"/>
+      </p:par>
+    </p:tnLst>
+  </p:timing>
+</p:sld>
+</file>
+
+<file path=ppt/slides/slide5.xml><?xml version="1.0" encoding="utf-8"?>
+<p:sld xmlns:a="http://schemas.openxmlformats.org/drawingml/2006/main" xmlns:r="http://schemas.openxmlformats.org/officeDocument/2006/relationships" xmlns:p="http://schemas.openxmlformats.org/presentationml/2006/main">
+  <p:cSld>
+    <p:spTree>
+      <p:nvGrpSpPr>
+        <p:cNvPr id="1" name=""/>
+        <p:cNvGrpSpPr/>
+        <p:nvPr/>
+      </p:nvGrpSpPr>
+      <p:grpSpPr>
+        <a:xfrm>
+          <a:off x="0" y="0"/>
+          <a:ext cx="0" cy="0"/>
+          <a:chOff x="0" y="0"/>
+          <a:chExt cx="0" cy="0"/>
+        </a:xfrm>
+      </p:grpSpPr>
+      <p:pic>
+        <p:nvPicPr>
+          <p:cNvPr id="1026" name="Picture 2" descr="G:\Working\Internal\BriteCoreNew\britecore-poc-api-master_test_result_session_authentication.png"/>
+          <p:cNvPicPr>
+            <a:picLocks noChangeAspect="1" noChangeArrowheads="1"/>
+          </p:cNvPicPr>
+          <p:nvPr/>
+        </p:nvPicPr>
+        <p:blipFill>
+          <a:blip r:embed="rId2"/>
+          <a:srcRect/>
+          <a:stretch>
+            <a:fillRect/>
+          </a:stretch>
+        </p:blipFill>
+        <p:spPr bwMode="auto">
+          <a:xfrm>
+            <a:off x="685800" y="685800"/>
+            <a:ext cx="7848600" cy="4495800"/>
+          </a:xfrm>
+          <a:prstGeom prst="rect">
+            <a:avLst/>
+          </a:prstGeom>
+          <a:noFill/>
+        </p:spPr>
+      </p:pic>
+    </p:spTree>
+  </p:cSld>
+  <p:clrMapOvr>
+    <a:masterClrMapping/>
+  </p:clrMapOvr>
+  <p:timing>
+    <p:tnLst>
+      <p:par>
+        <p:cTn id="1" dur="indefinite" restart="never" nodeType="tmRoot"/>
+      </p:par>
+    </p:tnLst>
+  </p:timing>
+</p:sld>
+</file>
+
+<file path=ppt/slides/slide6.xml><?xml version="1.0" encoding="utf-8"?>
+<p:sld xmlns:a="http://schemas.openxmlformats.org/drawingml/2006/main" xmlns:r="http://schemas.openxmlformats.org/officeDocument/2006/relationships" xmlns:p="http://schemas.openxmlformats.org/presentationml/2006/main">
+  <p:cSld>
+    <p:spTree>
+      <p:nvGrpSpPr>
+        <p:cNvPr id="1" name=""/>
+        <p:cNvGrpSpPr/>
+        <p:nvPr/>
+      </p:nvGrpSpPr>
+      <p:grpSpPr>
+        <a:xfrm>
+          <a:off x="0" y="0"/>
+          <a:ext cx="0" cy="0"/>
+          <a:chOff x="0" y="0"/>
+          <a:chExt cx="0" cy="0"/>
+        </a:xfrm>
+      </p:grpSpPr>
+      <p:sp>
+        <p:nvSpPr>
+          <p:cNvPr id="2" name="Title 1"/>
+          <p:cNvSpPr>
+            <a:spLocks noGrp="1"/>
+          </p:cNvSpPr>
+          <p:nvPr>
+            <p:ph type="title"/>
+          </p:nvPr>
+        </p:nvSpPr>
+        <p:spPr/>
+        <p:txBody>
+          <a:bodyPr/>
+          <a:lstStyle/>
+          <a:p>
+            <a:r>
+              <a:rPr lang="en-US" dirty="0" smtClean="0"/>
+              <a:t>Salient features</a:t>
+            </a:r>
+            <a:endParaRPr lang="en-US" dirty="0"/>
+          </a:p>
+        </p:txBody>
+      </p:sp>
+      <p:sp>
+        <p:nvSpPr>
+          <p:cNvPr id="3" name="Content Placeholder 2"/>
+          <p:cNvSpPr>
+            <a:spLocks noGrp="1"/>
+          </p:cNvSpPr>
+          <p:nvPr>
+            <p:ph idx="1"/>
+          </p:nvPr>
+        </p:nvSpPr>
+        <p:spPr/>
+        <p:txBody>
+          <a:bodyPr>
+            <a:normAutofit fontScale="85000" lnSpcReduction="10000"/>
+          </a:bodyPr>
+          <a:lstStyle/>
+          <a:p>
+            <a:r>
+              <a:rPr lang="en-US" dirty="0" smtClean="0"/>
+              <a:t>Solution that allows insurers to define their own custom data model for their risks. There are no database tables called automobiles, houses, or prizes. Instead, insurers will be able to create their own risk types and attach as many different fields as they would like.</a:t>
+            </a:r>
+          </a:p>
+          <a:p>
+            <a:r>
+              <a:rPr lang="en-US" dirty="0" smtClean="0"/>
+              <a:t>Fields are bits of data like first name, age, zip code, model, serial number, Coverage A limit, or prize dollar amount. Basically any data the carrier would want to collect about the risk. Fields can also be of different types, like text, date, number, currency, and so forth.</a:t>
+            </a:r>
+            <a:endParaRPr lang="en-US" dirty="0"/>
+          </a:p>
+        </p:txBody>
+      </p:sp>
+    </p:spTree>
+  </p:cSld>
+  <p:clrMapOvr>
+    <a:masterClrMapping/>
+  </p:clrMapOvr>
+  <p:timing>
+    <p:tnLst>
+      <p:par>
+        <p:cTn id="1" dur="indefinite" restart="never" nodeType="tmRoot"/>
+      </p:par>
+    </p:tnLst>
+  </p:timing>
+</p:sld>
+</file>
+
+<file path=ppt/slides/slide7.xml><?xml version="1.0" encoding="utf-8"?>
+<p:sld xmlns:a="http://schemas.openxmlformats.org/drawingml/2006/main" xmlns:r="http://schemas.openxmlformats.org/officeDocument/2006/relationships" xmlns:p="http://schemas.openxmlformats.org/presentationml/2006/main">
+  <p:cSld>
+    <p:spTree>
+      <p:nvGrpSpPr>
+        <p:cNvPr id="1" name=""/>
+        <p:cNvGrpSpPr/>
+        <p:nvPr/>
+      </p:nvGrpSpPr>
+      <p:grpSpPr>
+        <a:xfrm>
+          <a:off x="0" y="0"/>
+          <a:ext cx="0" cy="0"/>
+          <a:chOff x="0" y="0"/>
+          <a:chExt cx="0" cy="0"/>
+        </a:xfrm>
+      </p:grpSpPr>
+      <p:sp>
+        <p:nvSpPr>
+          <p:cNvPr id="2" name="Title 1"/>
+          <p:cNvSpPr>
+            <a:spLocks noGrp="1"/>
+          </p:cNvSpPr>
+          <p:nvPr>
+            <p:ph type="title"/>
+          </p:nvPr>
+        </p:nvSpPr>
+        <p:spPr/>
+        <p:txBody>
+          <a:bodyPr/>
+          <a:lstStyle/>
+          <a:p>
+            <a:r>
+              <a:rPr lang="en-US" dirty="0" smtClean="0"/>
+              <a:t>Salient features (continued)</a:t>
+            </a:r>
+            <a:endParaRPr lang="en-US" dirty="0"/>
+          </a:p>
+        </p:txBody>
+      </p:sp>
+      <p:sp>
+        <p:nvSpPr>
+          <p:cNvPr id="3" name="Content Placeholder 2"/>
+          <p:cNvSpPr>
+            <a:spLocks noGrp="1"/>
+          </p:cNvSpPr>
+          <p:nvPr>
+            <p:ph idx="1"/>
+          </p:nvPr>
+        </p:nvSpPr>
+        <p:spPr/>
+        <p:txBody>
+          <a:bodyPr>
+            <a:normAutofit fontScale="85000" lnSpcReduction="10000"/>
+          </a:bodyPr>
+          <a:lstStyle/>
+          <a:p>
+            <a:r>
+              <a:rPr lang="en-US" dirty="0" smtClean="0"/>
+              <a:t>As risk field types are user defined and not </a:t>
+            </a:r>
+            <a:r>
+              <a:rPr lang="en-US" dirty="0" err="1" smtClean="0"/>
+              <a:t>commited</a:t>
+            </a:r>
+            <a:r>
+              <a:rPr lang="en-US" dirty="0" smtClean="0"/>
+              <a:t> at time of table creation. Actual field/column value stored in table is string type. But field type sanctity is enforced using model </a:t>
+            </a:r>
+            <a:r>
+              <a:rPr lang="en-US" dirty="0" err="1" smtClean="0"/>
+              <a:t>validators</a:t>
+            </a:r>
+            <a:r>
+              <a:rPr lang="en-US" dirty="0" smtClean="0"/>
+              <a:t>. </a:t>
+            </a:r>
+            <a:r>
+              <a:rPr lang="en-US" dirty="0" err="1" smtClean="0"/>
+              <a:t>i.e</a:t>
+            </a:r>
+            <a:r>
+              <a:rPr lang="en-US" dirty="0" smtClean="0"/>
+              <a:t> User can not supply Date value where Currency is expected.</a:t>
+            </a:r>
+          </a:p>
+          <a:p>
+            <a:r>
+              <a:rPr lang="en-US" dirty="0" err="1" smtClean="0"/>
+              <a:t>Uniqness</a:t>
+            </a:r>
+            <a:r>
+              <a:rPr lang="en-US" dirty="0" smtClean="0"/>
+              <a:t> among </a:t>
+            </a:r>
+            <a:r>
+              <a:rPr lang="en-US" dirty="0" err="1" smtClean="0"/>
+              <a:t>RiskType</a:t>
+            </a:r>
+            <a:r>
+              <a:rPr lang="en-US" dirty="0" smtClean="0"/>
+              <a:t> names is maintained by enforcing unique constrain. But enforcing unique risk field name in similar fashion is somewhat restrictive and naive. I have tried to maintain unique field name within Risk Types and not across all Risk Type using mode </a:t>
+            </a:r>
+            <a:r>
+              <a:rPr lang="en-US" dirty="0" err="1" smtClean="0"/>
+              <a:t>validators</a:t>
+            </a:r>
+            <a:r>
+              <a:rPr lang="en-US" dirty="0" smtClean="0"/>
+              <a:t>.</a:t>
+            </a:r>
+            <a:endParaRPr lang="en-US" dirty="0"/>
+          </a:p>
+        </p:txBody>
+      </p:sp>
+    </p:spTree>
+  </p:cSld>
+  <p:clrMapOvr>
+    <a:masterClrMapping/>
+  </p:clrMapOvr>
+  <p:timing>
+    <p:tnLst>
+      <p:par>
+        <p:cTn id="1" dur="indefinite" restart="never" nodeType="tmRoot"/>
+      </p:par>
+    </p:tnLst>
+  </p:timing>
+</p:sld>
+</file>
+
+<file path=ppt/slides/slide8.xml><?xml version="1.0" encoding="utf-8"?>
+<p:sld xmlns:a="http://schemas.openxmlformats.org/drawingml/2006/main" xmlns:r="http://schemas.openxmlformats.org/officeDocument/2006/relationships" xmlns:p="http://schemas.openxmlformats.org/presentationml/2006/main">
+  <p:cSld>
+    <p:spTree>
+      <p:nvGrpSpPr>
+        <p:cNvPr id="1" name=""/>
+        <p:cNvGrpSpPr/>
+        <p:nvPr/>
+      </p:nvGrpSpPr>
+      <p:grpSpPr>
+        <a:xfrm>
+          <a:off x="0" y="0"/>
+          <a:ext cx="0" cy="0"/>
+          <a:chOff x="0" y="0"/>
+          <a:chExt cx="0" cy="0"/>
+        </a:xfrm>
+      </p:grpSpPr>
+      <p:sp>
+        <p:nvSpPr>
+          <p:cNvPr id="2" name="Title 1"/>
+          <p:cNvSpPr>
+            <a:spLocks noGrp="1"/>
+          </p:cNvSpPr>
+          <p:nvPr>
+            <p:ph type="title"/>
+          </p:nvPr>
+        </p:nvSpPr>
+        <p:spPr/>
+        <p:txBody>
+          <a:bodyPr/>
+          <a:lstStyle/>
+          <a:p>
+            <a:r>
+              <a:rPr lang="en-US" dirty="0" smtClean="0"/>
+              <a:t>Salient features (continued)</a:t>
+            </a:r>
+            <a:endParaRPr lang="en-US" dirty="0"/>
+          </a:p>
+        </p:txBody>
+      </p:sp>
+      <p:sp>
+        <p:nvSpPr>
+          <p:cNvPr id="3" name="Content Placeholder 2"/>
+          <p:cNvSpPr>
+            <a:spLocks noGrp="1"/>
+          </p:cNvSpPr>
+          <p:nvPr>
+            <p:ph idx="1"/>
+          </p:nvPr>
+        </p:nvSpPr>
+        <p:spPr/>
+        <p:txBody>
+          <a:bodyPr>
+            <a:normAutofit fontScale="70000" lnSpcReduction="20000"/>
+          </a:bodyPr>
+          <a:lstStyle/>
+          <a:p>
+            <a:r>
+              <a:rPr lang="en-US" dirty="0" smtClean="0"/>
+              <a:t>During risk and risk field creation  system checks that proper referential integrity is maintained among Risk Type and Risks. Risk Fields ensures that proper referential integrity is maintained with Risk Type and Risk Type fields.</a:t>
+            </a:r>
+          </a:p>
+          <a:p>
+            <a:endParaRPr lang="en-US" dirty="0" smtClean="0"/>
+          </a:p>
+          <a:p>
+            <a:r>
+              <a:rPr lang="en-US" dirty="0" smtClean="0"/>
+              <a:t>Risk API allows users to create </a:t>
+            </a:r>
+            <a:r>
+              <a:rPr lang="en-US" dirty="0" err="1" smtClean="0"/>
+              <a:t>RiskTypes</a:t>
+            </a:r>
+            <a:r>
+              <a:rPr lang="en-US" dirty="0" smtClean="0"/>
+              <a:t> and associated </a:t>
+            </a:r>
+            <a:r>
+              <a:rPr lang="en-US" dirty="0" err="1" smtClean="0"/>
+              <a:t>RiskTypeFields</a:t>
+            </a:r>
+            <a:r>
+              <a:rPr lang="en-US" dirty="0" smtClean="0"/>
+              <a:t> in one go with use of nested </a:t>
+            </a:r>
+            <a:r>
+              <a:rPr lang="en-US" dirty="0" err="1" smtClean="0"/>
+              <a:t>serializer</a:t>
+            </a:r>
+            <a:r>
+              <a:rPr lang="en-US" dirty="0" smtClean="0"/>
+              <a:t>.</a:t>
+            </a:r>
+          </a:p>
+          <a:p>
+            <a:endParaRPr lang="en-US" dirty="0" smtClean="0"/>
+          </a:p>
+          <a:p>
+            <a:r>
+              <a:rPr lang="en-US" dirty="0" smtClean="0"/>
+              <a:t>Risk API allows users to create Risk and associated </a:t>
+            </a:r>
+            <a:r>
+              <a:rPr lang="en-US" dirty="0" err="1" smtClean="0"/>
+              <a:t>RiskFields</a:t>
+            </a:r>
+            <a:r>
+              <a:rPr lang="en-US" dirty="0" smtClean="0"/>
+              <a:t> in one go with use of nested </a:t>
+            </a:r>
+            <a:r>
+              <a:rPr lang="en-US" dirty="0" err="1" smtClean="0"/>
+              <a:t>serializer</a:t>
+            </a:r>
+            <a:r>
+              <a:rPr lang="en-US" dirty="0" smtClean="0"/>
+              <a:t>.</a:t>
+            </a:r>
+          </a:p>
+          <a:p>
+            <a:endParaRPr lang="en-US" dirty="0" smtClean="0"/>
+          </a:p>
+          <a:p>
+            <a:r>
+              <a:rPr lang="en-US" dirty="0" smtClean="0"/>
+              <a:t>Various model validation errors within </a:t>
+            </a:r>
+            <a:r>
+              <a:rPr lang="en-US" dirty="0" err="1" smtClean="0"/>
+              <a:t>RiskType</a:t>
+            </a:r>
+            <a:r>
+              <a:rPr lang="en-US" dirty="0" smtClean="0"/>
+              <a:t> and </a:t>
+            </a:r>
+            <a:r>
+              <a:rPr lang="en-US" dirty="0" err="1" smtClean="0"/>
+              <a:t>RiskTypeFields</a:t>
+            </a:r>
+            <a:r>
+              <a:rPr lang="en-US" dirty="0" smtClean="0"/>
+              <a:t>, Risk and </a:t>
+            </a:r>
+            <a:r>
+              <a:rPr lang="en-US" dirty="0" err="1" smtClean="0"/>
+              <a:t>RiskFields</a:t>
+            </a:r>
+            <a:r>
+              <a:rPr lang="en-US" dirty="0" smtClean="0"/>
+              <a:t> are returned to client of </a:t>
+            </a:r>
+            <a:r>
+              <a:rPr lang="en-US" dirty="0" err="1" smtClean="0"/>
+              <a:t>RiskAPI</a:t>
+            </a:r>
+            <a:r>
+              <a:rPr lang="en-US" dirty="0" smtClean="0"/>
+              <a:t> in JSON format.</a:t>
+            </a:r>
+          </a:p>
+          <a:p>
+            <a:endParaRPr lang="en-US" dirty="0"/>
+          </a:p>
+        </p:txBody>
+      </p:sp>
+    </p:spTree>
+  </p:cSld>
+  <p:clrMapOvr>
+    <a:masterClrMapping/>
+  </p:clrMapOvr>
+  <p:timing>
+    <p:tnLst>
+      <p:par>
+        <p:cTn id="1" dur="indefinite" restart="never" nodeType="tmRoot"/>
+      </p:par>
+    </p:tnLst>
+  </p:timing>
+</p:sld>
+</file>
+
+<file path=ppt/slides/slide9.xml><?xml version="1.0" encoding="utf-8"?>
+<p:sld xmlns:a="http://schemas.openxmlformats.org/drawingml/2006/main" xmlns:r="http://schemas.openxmlformats.org/officeDocument/2006/relationships" xmlns:p="http://schemas.openxmlformats.org/presentationml/2006/main">
+  <p:cSld>
+    <p:spTree>
+      <p:nvGrpSpPr>
+        <p:cNvPr id="1" name=""/>
+        <p:cNvGrpSpPr/>
+        <p:nvPr/>
+      </p:nvGrpSpPr>
+      <p:grpSpPr>
+        <a:xfrm>
+          <a:off x="0" y="0"/>
+          <a:ext cx="0" cy="0"/>
+          <a:chOff x="0" y="0"/>
+          <a:chExt cx="0" cy="0"/>
+        </a:xfrm>
+      </p:grpSpPr>
+      <p:sp>
+        <p:nvSpPr>
+          <p:cNvPr id="2" name="Title 1"/>
+          <p:cNvSpPr>
+            <a:spLocks noGrp="1"/>
+          </p:cNvSpPr>
+          <p:nvPr>
+            <p:ph type="title"/>
+          </p:nvPr>
+        </p:nvSpPr>
+        <p:spPr/>
+        <p:txBody>
+          <a:bodyPr/>
+          <a:lstStyle/>
+          <a:p>
+            <a:r>
+              <a:rPr lang="en-US" dirty="0" smtClean="0"/>
+              <a:t>Salient features (continued)</a:t>
+            </a:r>
+            <a:endParaRPr lang="en-US" dirty="0"/>
+          </a:p>
+        </p:txBody>
+      </p:sp>
+      <p:sp>
+        <p:nvSpPr>
+          <p:cNvPr id="3" name="Content Placeholder 2"/>
+          <p:cNvSpPr>
+            <a:spLocks noGrp="1"/>
+          </p:cNvSpPr>
+          <p:nvPr>
+            <p:ph idx="1"/>
+          </p:nvPr>
+        </p:nvSpPr>
+        <p:spPr/>
+        <p:txBody>
+          <a:bodyPr>
+            <a:normAutofit fontScale="70000" lnSpcReduction="20000"/>
+          </a:bodyPr>
+          <a:lstStyle/>
+          <a:p>
+            <a:r>
+              <a:rPr lang="en-US" dirty="0" smtClean="0"/>
+              <a:t>Risk and </a:t>
+            </a:r>
+            <a:r>
+              <a:rPr lang="en-US" dirty="0" err="1" smtClean="0"/>
+              <a:t>RiskFields</a:t>
+            </a:r>
+            <a:r>
+              <a:rPr lang="en-US" dirty="0" smtClean="0"/>
+              <a:t> carry extra metadata related to </a:t>
+            </a:r>
+            <a:r>
+              <a:rPr lang="en-US" dirty="0" err="1" smtClean="0"/>
+              <a:t>RiskType</a:t>
+            </a:r>
+            <a:r>
+              <a:rPr lang="en-US" dirty="0" smtClean="0"/>
+              <a:t> and </a:t>
+            </a:r>
+            <a:r>
+              <a:rPr lang="en-US" dirty="0" err="1" smtClean="0"/>
+              <a:t>RiskTypeFields</a:t>
+            </a:r>
+            <a:r>
+              <a:rPr lang="en-US" dirty="0" smtClean="0"/>
+              <a:t>.</a:t>
+            </a:r>
+          </a:p>
+          <a:p>
+            <a:endParaRPr lang="en-US" dirty="0" smtClean="0"/>
+          </a:p>
+          <a:p>
+            <a:r>
+              <a:rPr lang="en-US" dirty="0" smtClean="0"/>
+              <a:t>On authentication front, only authenticated users can access </a:t>
+            </a:r>
+            <a:r>
+              <a:rPr lang="en-US" dirty="0" err="1" smtClean="0"/>
+              <a:t>RiskAPI</a:t>
+            </a:r>
+            <a:r>
+              <a:rPr lang="en-US" dirty="0" smtClean="0"/>
+              <a:t>. Role based authorization further enable only admin users to create/delete </a:t>
+            </a:r>
+            <a:r>
+              <a:rPr lang="en-US" dirty="0" err="1" smtClean="0"/>
+              <a:t>RiskType</a:t>
+            </a:r>
+            <a:r>
+              <a:rPr lang="en-US" dirty="0" smtClean="0"/>
+              <a:t>. Non admin users only have list and details option for </a:t>
+            </a:r>
+            <a:r>
+              <a:rPr lang="en-US" dirty="0" err="1" smtClean="0"/>
+              <a:t>RiskTypes</a:t>
+            </a:r>
+            <a:r>
+              <a:rPr lang="en-US" dirty="0" smtClean="0"/>
+              <a:t>. However they can create Risk instances based on </a:t>
+            </a:r>
+            <a:r>
+              <a:rPr lang="en-US" dirty="0" err="1" smtClean="0"/>
+              <a:t>RiskTypes</a:t>
+            </a:r>
+            <a:r>
+              <a:rPr lang="en-US" dirty="0" smtClean="0"/>
+              <a:t>.</a:t>
+            </a:r>
+          </a:p>
+          <a:p>
+            <a:endParaRPr lang="en-US" dirty="0" smtClean="0"/>
+          </a:p>
+          <a:p>
+            <a:r>
+              <a:rPr lang="en-US" dirty="0" smtClean="0"/>
+              <a:t>Session authentication is used for browsable API that runs within same session that of Web API</a:t>
+            </a:r>
+          </a:p>
+          <a:p>
+            <a:endParaRPr lang="en-US" dirty="0" smtClean="0"/>
+          </a:p>
+          <a:p>
+            <a:r>
+              <a:rPr lang="en-US" dirty="0" smtClean="0"/>
+              <a:t>Token authentication is used for </a:t>
+            </a:r>
+            <a:r>
+              <a:rPr lang="en-US" dirty="0" err="1" smtClean="0"/>
+              <a:t>seperate</a:t>
+            </a:r>
+            <a:r>
+              <a:rPr lang="en-US" dirty="0" smtClean="0"/>
+              <a:t> website that access Web API for retrieving and creating </a:t>
+            </a:r>
+            <a:r>
+              <a:rPr lang="en-US" dirty="0" err="1" smtClean="0"/>
+              <a:t>RiskTypes</a:t>
+            </a:r>
+            <a:r>
+              <a:rPr lang="en-US" dirty="0" smtClean="0"/>
+              <a:t> and Risk.</a:t>
+            </a:r>
+          </a:p>
+          <a:p>
+            <a:endParaRPr lang="en-US" dirty="0"/>
+          </a:p>
+        </p:txBody>
+      </p:sp>
     </p:spTree>
   </p:cSld>
   <p:clrMapOvr>

</xml_diff>